<commit_message>
word typo + ppt skoro gotovo
</commit_message>
<xml_diff>
--- a/Aleksandra Bogicevic 170390.pptx
+++ b/Aleksandra Bogicevic 170390.pptx
@@ -5,7 +5,7 @@
     <p:sldMasterId id="2147483735" r:id="rId1"/>
   </p:sldMasterIdLst>
   <p:notesMasterIdLst>
-    <p:notesMasterId r:id="rId11"/>
+    <p:notesMasterId r:id="rId15"/>
   </p:notesMasterIdLst>
   <p:sldIdLst>
     <p:sldId id="256" r:id="rId2"/>
@@ -14,9 +14,13 @@
     <p:sldId id="258" r:id="rId5"/>
     <p:sldId id="259" r:id="rId6"/>
     <p:sldId id="260" r:id="rId7"/>
-    <p:sldId id="261" r:id="rId8"/>
-    <p:sldId id="262" r:id="rId9"/>
-    <p:sldId id="264" r:id="rId10"/>
+    <p:sldId id="265" r:id="rId8"/>
+    <p:sldId id="266" r:id="rId9"/>
+    <p:sldId id="267" r:id="rId10"/>
+    <p:sldId id="268" r:id="rId11"/>
+    <p:sldId id="261" r:id="rId12"/>
+    <p:sldId id="262" r:id="rId13"/>
+    <p:sldId id="264" r:id="rId14"/>
   </p:sldIdLst>
   <p:sldSz cx="12192000" cy="6858000"/>
   <p:notesSz cx="6858000" cy="9144000"/>
@@ -4016,6 +4020,1059 @@
 </p:sld>
 </file>
 
+<file path=ppt/slides/slide10.xml><?xml version="1.0" encoding="utf-8"?>
+<p:sld xmlns:a="http://schemas.openxmlformats.org/drawingml/2006/main" xmlns:r="http://schemas.openxmlformats.org/officeDocument/2006/relationships" xmlns:p="http://schemas.openxmlformats.org/presentationml/2006/main">
+  <p:cSld>
+    <p:spTree>
+      <p:nvGrpSpPr>
+        <p:cNvPr id="1" name=""/>
+        <p:cNvGrpSpPr/>
+        <p:nvPr/>
+      </p:nvGrpSpPr>
+      <p:grpSpPr>
+        <a:xfrm>
+          <a:off x="0" y="0"/>
+          <a:ext cx="0" cy="0"/>
+          <a:chOff x="0" y="0"/>
+          <a:chExt cx="0" cy="0"/>
+        </a:xfrm>
+      </p:grpSpPr>
+      <p:sp>
+        <p:nvSpPr>
+          <p:cNvPr id="2" name="Title 1">
+            <a:extLst>
+              <a:ext uri="{FF2B5EF4-FFF2-40B4-BE49-F238E27FC236}">
+                <a16:creationId xmlns:a16="http://schemas.microsoft.com/office/drawing/2014/main" id="{A1A7569B-51B3-4B47-9E59-938EDC1CB84B}"/>
+              </a:ext>
+            </a:extLst>
+          </p:cNvPr>
+          <p:cNvSpPr>
+            <a:spLocks noGrp="1"/>
+          </p:cNvSpPr>
+          <p:nvPr>
+            <p:ph type="title"/>
+          </p:nvPr>
+        </p:nvSpPr>
+        <p:spPr/>
+        <p:txBody>
+          <a:bodyPr>
+            <a:normAutofit/>
+          </a:bodyPr>
+          <a:lstStyle/>
+          <a:p>
+            <a:r>
+              <a:rPr lang="sr-Cyrl-RS" sz="2400" dirty="0">
+                <a:latin typeface="+mn-lt"/>
+              </a:rPr>
+              <a:t>Изглед обавештења</a:t>
+            </a:r>
+            <a:endParaRPr lang="en-US" sz="2400" dirty="0">
+              <a:latin typeface="+mn-lt"/>
+            </a:endParaRPr>
+          </a:p>
+        </p:txBody>
+      </p:sp>
+      <p:pic>
+        <p:nvPicPr>
+          <p:cNvPr id="6" name="Content Placeholder 5" descr="Graphical user interface, application&#10;&#10;Description automatically generated">
+            <a:extLst>
+              <a:ext uri="{FF2B5EF4-FFF2-40B4-BE49-F238E27FC236}">
+                <a16:creationId xmlns:a16="http://schemas.microsoft.com/office/drawing/2014/main" id="{15E322E3-09BF-473B-A9A3-C13FD38F73A5}"/>
+              </a:ext>
+            </a:extLst>
+          </p:cNvPr>
+          <p:cNvPicPr>
+            <a:picLocks noGrp="1" noChangeAspect="1"/>
+          </p:cNvPicPr>
+          <p:nvPr>
+            <p:ph idx="1"/>
+          </p:nvPr>
+        </p:nvPicPr>
+        <p:blipFill>
+          <a:blip r:embed="rId2">
+            <a:extLst>
+              <a:ext uri="{28A0092B-C50C-407E-A947-70E740481C1C}">
+                <a14:useLocalDpi xmlns:a14="http://schemas.microsoft.com/office/drawing/2010/main" val="0"/>
+              </a:ext>
+            </a:extLst>
+          </a:blip>
+          <a:stretch>
+            <a:fillRect/>
+          </a:stretch>
+        </p:blipFill>
+        <p:spPr>
+          <a:xfrm>
+            <a:off x="3056561" y="1771734"/>
+            <a:ext cx="6078878" cy="3314532"/>
+          </a:xfrm>
+        </p:spPr>
+      </p:pic>
+      <p:sp>
+        <p:nvSpPr>
+          <p:cNvPr id="4" name="Slide Number Placeholder 3">
+            <a:extLst>
+              <a:ext uri="{FF2B5EF4-FFF2-40B4-BE49-F238E27FC236}">
+                <a16:creationId xmlns:a16="http://schemas.microsoft.com/office/drawing/2014/main" id="{A5DCD8FC-EC29-4C87-9C20-AF1300C73424}"/>
+              </a:ext>
+            </a:extLst>
+          </p:cNvPr>
+          <p:cNvSpPr>
+            <a:spLocks noGrp="1"/>
+          </p:cNvSpPr>
+          <p:nvPr>
+            <p:ph type="sldNum" sz="quarter" idx="12"/>
+          </p:nvPr>
+        </p:nvSpPr>
+        <p:spPr/>
+        <p:txBody>
+          <a:bodyPr/>
+          <a:lstStyle/>
+          <a:p>
+            <a:fld id="{A95D94BB-3F08-4867-8133-8201904E9445}" type="slidenum">
+              <a:rPr lang="en-US" smtClean="0"/>
+              <a:t>10</a:t>
+            </a:fld>
+            <a:endParaRPr lang="en-US"/>
+          </a:p>
+        </p:txBody>
+      </p:sp>
+    </p:spTree>
+    <p:extLst>
+      <p:ext uri="{BB962C8B-B14F-4D97-AF65-F5344CB8AC3E}">
+        <p14:creationId xmlns:p14="http://schemas.microsoft.com/office/powerpoint/2010/main" val="159604313"/>
+      </p:ext>
+    </p:extLst>
+  </p:cSld>
+  <p:clrMapOvr>
+    <a:masterClrMapping/>
+  </p:clrMapOvr>
+</p:sld>
+</file>
+
+<file path=ppt/slides/slide11.xml><?xml version="1.0" encoding="utf-8"?>
+<p:sld xmlns:a="http://schemas.openxmlformats.org/drawingml/2006/main" xmlns:r="http://schemas.openxmlformats.org/officeDocument/2006/relationships" xmlns:p="http://schemas.openxmlformats.org/presentationml/2006/main">
+  <p:cSld>
+    <p:spTree>
+      <p:nvGrpSpPr>
+        <p:cNvPr id="1" name=""/>
+        <p:cNvGrpSpPr/>
+        <p:nvPr/>
+      </p:nvGrpSpPr>
+      <p:grpSpPr>
+        <a:xfrm>
+          <a:off x="0" y="0"/>
+          <a:ext cx="0" cy="0"/>
+          <a:chOff x="0" y="0"/>
+          <a:chExt cx="0" cy="0"/>
+        </a:xfrm>
+      </p:grpSpPr>
+      <p:sp>
+        <p:nvSpPr>
+          <p:cNvPr id="2" name="Title 1">
+            <a:extLst>
+              <a:ext uri="{FF2B5EF4-FFF2-40B4-BE49-F238E27FC236}">
+                <a16:creationId xmlns:a16="http://schemas.microsoft.com/office/drawing/2014/main" id="{154B8461-21EA-44A9-A4F3-2D88009D6BDB}"/>
+              </a:ext>
+            </a:extLst>
+          </p:cNvPr>
+          <p:cNvSpPr>
+            <a:spLocks noGrp="1"/>
+          </p:cNvSpPr>
+          <p:nvPr>
+            <p:ph type="title"/>
+          </p:nvPr>
+        </p:nvSpPr>
+        <p:spPr/>
+        <p:txBody>
+          <a:bodyPr/>
+          <a:lstStyle/>
+          <a:p>
+            <a:r>
+              <a:rPr lang="sr-Cyrl-RS" b="1" dirty="0"/>
+              <a:t>Реализација система</a:t>
+            </a:r>
+            <a:endParaRPr lang="en-US" b="1" dirty="0"/>
+          </a:p>
+        </p:txBody>
+      </p:sp>
+      <p:sp>
+        <p:nvSpPr>
+          <p:cNvPr id="3" name="Content Placeholder 2">
+            <a:extLst>
+              <a:ext uri="{FF2B5EF4-FFF2-40B4-BE49-F238E27FC236}">
+                <a16:creationId xmlns:a16="http://schemas.microsoft.com/office/drawing/2014/main" id="{814E04A5-9573-4459-944A-B657D252DF7B}"/>
+              </a:ext>
+            </a:extLst>
+          </p:cNvPr>
+          <p:cNvSpPr>
+            <a:spLocks noGrp="1"/>
+          </p:cNvSpPr>
+          <p:nvPr>
+            <p:ph idx="1"/>
+          </p:nvPr>
+        </p:nvSpPr>
+        <p:spPr>
+          <a:xfrm>
+            <a:off x="838200" y="1690688"/>
+            <a:ext cx="10515600" cy="4351338"/>
+          </a:xfrm>
+        </p:spPr>
+        <p:txBody>
+          <a:bodyPr/>
+          <a:lstStyle/>
+          <a:p>
+            <a:pPr marL="342900" marR="0" lvl="0" indent="-342900" algn="just">
+              <a:lnSpc>
+                <a:spcPct val="150000"/>
+              </a:lnSpc>
+              <a:spcBef>
+                <a:spcPts val="0"/>
+              </a:spcBef>
+              <a:spcAft>
+                <a:spcPts val="0"/>
+              </a:spcAft>
+              <a:buFont typeface="Symbol" panose="05050102010706020507" pitchFamily="18" charset="2"/>
+              <a:buChar char=""/>
+            </a:pPr>
+            <a:r>
+              <a:rPr lang="en-US" sz="1600" i="1" dirty="0" err="1">
+                <a:effectLst/>
+                <a:latin typeface="Times New Roman" panose="02020603050405020304" pitchFamily="18" charset="0"/>
+                <a:ea typeface="Calibri" panose="020F0502020204030204" pitchFamily="34" charset="0"/>
+                <a:cs typeface="Times New Roman" panose="02020603050405020304" pitchFamily="18" charset="0"/>
+              </a:rPr>
+              <a:t>manifest.json</a:t>
+            </a:r>
+            <a:endParaRPr lang="en-US" sz="1600" dirty="0">
+              <a:effectLst/>
+              <a:latin typeface="Times New Roman" panose="02020603050405020304" pitchFamily="18" charset="0"/>
+              <a:ea typeface="Calibri" panose="020F0502020204030204" pitchFamily="34" charset="0"/>
+              <a:cs typeface="Times New Roman" panose="02020603050405020304" pitchFamily="18" charset="0"/>
+            </a:endParaRPr>
+          </a:p>
+          <a:p>
+            <a:pPr marL="342900" marR="0" lvl="0" indent="-342900" algn="just">
+              <a:lnSpc>
+                <a:spcPct val="150000"/>
+              </a:lnSpc>
+              <a:spcBef>
+                <a:spcPts val="0"/>
+              </a:spcBef>
+              <a:spcAft>
+                <a:spcPts val="0"/>
+              </a:spcAft>
+              <a:buFont typeface="Symbol" panose="05050102010706020507" pitchFamily="18" charset="2"/>
+              <a:buChar char=""/>
+            </a:pPr>
+            <a:r>
+              <a:rPr lang="sr-Cyrl-RS" sz="1600" dirty="0">
+                <a:effectLst/>
+                <a:latin typeface="Times New Roman" panose="02020603050405020304" pitchFamily="18" charset="0"/>
+                <a:ea typeface="Calibri" panose="020F0502020204030204" pitchFamily="34" charset="0"/>
+                <a:cs typeface="Times New Roman" panose="02020603050405020304" pitchFamily="18" charset="0"/>
+              </a:rPr>
+              <a:t>дадтотеке које чине страницу са опцијама</a:t>
+            </a:r>
+            <a:r>
+              <a:rPr lang="en-US" sz="1600" dirty="0">
+                <a:effectLst/>
+                <a:latin typeface="Times New Roman" panose="02020603050405020304" pitchFamily="18" charset="0"/>
+                <a:ea typeface="Calibri" panose="020F0502020204030204" pitchFamily="34" charset="0"/>
+                <a:cs typeface="Times New Roman" panose="02020603050405020304" pitchFamily="18" charset="0"/>
+              </a:rPr>
+              <a:t>:</a:t>
+            </a:r>
+          </a:p>
+          <a:p>
+            <a:pPr marL="742950" marR="0" lvl="1" indent="-285750" algn="just">
+              <a:lnSpc>
+                <a:spcPct val="150000"/>
+              </a:lnSpc>
+              <a:spcBef>
+                <a:spcPts val="0"/>
+              </a:spcBef>
+              <a:spcAft>
+                <a:spcPts val="0"/>
+              </a:spcAft>
+              <a:buFont typeface="Courier New" panose="02070309020205020404" pitchFamily="49" charset="0"/>
+              <a:buChar char="-"/>
+            </a:pPr>
+            <a:r>
+              <a:rPr lang="sr-Cyrl-RS" sz="1600" dirty="0">
+                <a:effectLst/>
+                <a:latin typeface="Times New Roman" panose="02020603050405020304" pitchFamily="18" charset="0"/>
+                <a:ea typeface="Calibri" panose="020F0502020204030204" pitchFamily="34" charset="0"/>
+                <a:cs typeface="Times New Roman" panose="02020603050405020304" pitchFamily="18" charset="0"/>
+              </a:rPr>
+              <a:t> </a:t>
+            </a:r>
+            <a:r>
+              <a:rPr lang="en-US" sz="1600" i="1" dirty="0">
+                <a:effectLst/>
+                <a:latin typeface="Times New Roman" panose="02020603050405020304" pitchFamily="18" charset="0"/>
+                <a:ea typeface="Calibri" panose="020F0502020204030204" pitchFamily="34" charset="0"/>
+                <a:cs typeface="Times New Roman" panose="02020603050405020304" pitchFamily="18" charset="0"/>
+              </a:rPr>
+              <a:t>options.html</a:t>
+            </a:r>
+            <a:endParaRPr lang="en-US" sz="1600" dirty="0">
+              <a:effectLst/>
+              <a:latin typeface="Times New Roman" panose="02020603050405020304" pitchFamily="18" charset="0"/>
+              <a:ea typeface="Calibri" panose="020F0502020204030204" pitchFamily="34" charset="0"/>
+              <a:cs typeface="Times New Roman" panose="02020603050405020304" pitchFamily="18" charset="0"/>
+            </a:endParaRPr>
+          </a:p>
+          <a:p>
+            <a:pPr marL="742950" marR="0" lvl="1" indent="-285750" algn="just">
+              <a:lnSpc>
+                <a:spcPct val="150000"/>
+              </a:lnSpc>
+              <a:spcBef>
+                <a:spcPts val="0"/>
+              </a:spcBef>
+              <a:spcAft>
+                <a:spcPts val="0"/>
+              </a:spcAft>
+              <a:buFont typeface="Courier New" panose="02070309020205020404" pitchFamily="49" charset="0"/>
+              <a:buChar char="-"/>
+            </a:pPr>
+            <a:r>
+              <a:rPr lang="en-US" sz="1600" i="1" dirty="0">
+                <a:effectLst/>
+                <a:latin typeface="Times New Roman" panose="02020603050405020304" pitchFamily="18" charset="0"/>
+                <a:ea typeface="Calibri" panose="020F0502020204030204" pitchFamily="34" charset="0"/>
+                <a:cs typeface="Times New Roman" panose="02020603050405020304" pitchFamily="18" charset="0"/>
+              </a:rPr>
+              <a:t> options.css</a:t>
+            </a:r>
+            <a:endParaRPr lang="en-US" sz="1600" dirty="0">
+              <a:effectLst/>
+              <a:latin typeface="Times New Roman" panose="02020603050405020304" pitchFamily="18" charset="0"/>
+              <a:ea typeface="Calibri" panose="020F0502020204030204" pitchFamily="34" charset="0"/>
+              <a:cs typeface="Times New Roman" panose="02020603050405020304" pitchFamily="18" charset="0"/>
+            </a:endParaRPr>
+          </a:p>
+          <a:p>
+            <a:pPr marL="742950" marR="0" lvl="1" indent="-285750" algn="just">
+              <a:lnSpc>
+                <a:spcPct val="150000"/>
+              </a:lnSpc>
+              <a:spcBef>
+                <a:spcPts val="0"/>
+              </a:spcBef>
+              <a:spcAft>
+                <a:spcPts val="0"/>
+              </a:spcAft>
+              <a:buFont typeface="Courier New" panose="02070309020205020404" pitchFamily="49" charset="0"/>
+              <a:buChar char="-"/>
+            </a:pPr>
+            <a:r>
+              <a:rPr lang="en-US" sz="1600" i="1" dirty="0">
+                <a:effectLst/>
+                <a:latin typeface="Times New Roman" panose="02020603050405020304" pitchFamily="18" charset="0"/>
+                <a:ea typeface="Calibri" panose="020F0502020204030204" pitchFamily="34" charset="0"/>
+                <a:cs typeface="Times New Roman" panose="02020603050405020304" pitchFamily="18" charset="0"/>
+              </a:rPr>
+              <a:t> options.js</a:t>
+            </a:r>
+            <a:endParaRPr lang="en-US" sz="1600" dirty="0">
+              <a:effectLst/>
+              <a:latin typeface="Times New Roman" panose="02020603050405020304" pitchFamily="18" charset="0"/>
+              <a:ea typeface="Calibri" panose="020F0502020204030204" pitchFamily="34" charset="0"/>
+              <a:cs typeface="Times New Roman" panose="02020603050405020304" pitchFamily="18" charset="0"/>
+            </a:endParaRPr>
+          </a:p>
+          <a:p>
+            <a:pPr marL="342900" marR="0" lvl="0" indent="-342900" algn="just">
+              <a:lnSpc>
+                <a:spcPct val="150000"/>
+              </a:lnSpc>
+              <a:spcBef>
+                <a:spcPts val="0"/>
+              </a:spcBef>
+              <a:spcAft>
+                <a:spcPts val="0"/>
+              </a:spcAft>
+              <a:buFont typeface="Symbol" panose="05050102010706020507" pitchFamily="18" charset="2"/>
+              <a:buChar char=""/>
+            </a:pPr>
+            <a:r>
+              <a:rPr lang="sr-Cyrl-RS" sz="1600" dirty="0">
+                <a:effectLst/>
+                <a:latin typeface="Times New Roman" panose="02020603050405020304" pitchFamily="18" charset="0"/>
+                <a:ea typeface="Calibri" panose="020F0502020204030204" pitchFamily="34" charset="0"/>
+                <a:cs typeface="Times New Roman" panose="02020603050405020304" pitchFamily="18" charset="0"/>
+              </a:rPr>
+              <a:t>датотеке које чине кориснички интерфејс екстензије</a:t>
+            </a:r>
+            <a:r>
+              <a:rPr lang="en-US" sz="1600" dirty="0">
+                <a:effectLst/>
+                <a:latin typeface="Times New Roman" panose="02020603050405020304" pitchFamily="18" charset="0"/>
+                <a:ea typeface="Calibri" panose="020F0502020204030204" pitchFamily="34" charset="0"/>
+                <a:cs typeface="Times New Roman" panose="02020603050405020304" pitchFamily="18" charset="0"/>
+              </a:rPr>
+              <a:t>:</a:t>
+            </a:r>
+          </a:p>
+          <a:p>
+            <a:pPr marL="742950" marR="0" lvl="1" indent="-285750" algn="just">
+              <a:lnSpc>
+                <a:spcPct val="150000"/>
+              </a:lnSpc>
+              <a:spcBef>
+                <a:spcPts val="0"/>
+              </a:spcBef>
+              <a:spcAft>
+                <a:spcPts val="0"/>
+              </a:spcAft>
+              <a:buFont typeface="Courier New" panose="02070309020205020404" pitchFamily="49" charset="0"/>
+              <a:buChar char="-"/>
+            </a:pPr>
+            <a:r>
+              <a:rPr lang="en-US" sz="1600" i="1" dirty="0">
+                <a:effectLst/>
+                <a:latin typeface="Times New Roman" panose="02020603050405020304" pitchFamily="18" charset="0"/>
+                <a:ea typeface="Calibri" panose="020F0502020204030204" pitchFamily="34" charset="0"/>
+                <a:cs typeface="Times New Roman" panose="02020603050405020304" pitchFamily="18" charset="0"/>
+              </a:rPr>
+              <a:t>popup.html</a:t>
+            </a:r>
+            <a:endParaRPr lang="en-US" sz="1600" dirty="0">
+              <a:effectLst/>
+              <a:latin typeface="Times New Roman" panose="02020603050405020304" pitchFamily="18" charset="0"/>
+              <a:ea typeface="Calibri" panose="020F0502020204030204" pitchFamily="34" charset="0"/>
+              <a:cs typeface="Times New Roman" panose="02020603050405020304" pitchFamily="18" charset="0"/>
+            </a:endParaRPr>
+          </a:p>
+          <a:p>
+            <a:pPr marL="742950" marR="0" lvl="1" indent="-285750" algn="just">
+              <a:lnSpc>
+                <a:spcPct val="150000"/>
+              </a:lnSpc>
+              <a:spcBef>
+                <a:spcPts val="0"/>
+              </a:spcBef>
+              <a:spcAft>
+                <a:spcPts val="0"/>
+              </a:spcAft>
+              <a:buFont typeface="Courier New" panose="02070309020205020404" pitchFamily="49" charset="0"/>
+              <a:buChar char="-"/>
+            </a:pPr>
+            <a:r>
+              <a:rPr lang="en-US" sz="1600" i="1" dirty="0">
+                <a:effectLst/>
+                <a:latin typeface="Times New Roman" panose="02020603050405020304" pitchFamily="18" charset="0"/>
+                <a:ea typeface="Calibri" panose="020F0502020204030204" pitchFamily="34" charset="0"/>
+                <a:cs typeface="Times New Roman" panose="02020603050405020304" pitchFamily="18" charset="0"/>
+              </a:rPr>
+              <a:t>popup.css</a:t>
+            </a:r>
+            <a:endParaRPr lang="en-US" sz="1600" dirty="0">
+              <a:effectLst/>
+              <a:latin typeface="Times New Roman" panose="02020603050405020304" pitchFamily="18" charset="0"/>
+              <a:ea typeface="Calibri" panose="020F0502020204030204" pitchFamily="34" charset="0"/>
+              <a:cs typeface="Times New Roman" panose="02020603050405020304" pitchFamily="18" charset="0"/>
+            </a:endParaRPr>
+          </a:p>
+          <a:p>
+            <a:pPr marL="342900" marR="0" lvl="0" indent="-342900" algn="just">
+              <a:lnSpc>
+                <a:spcPct val="150000"/>
+              </a:lnSpc>
+              <a:spcBef>
+                <a:spcPts val="0"/>
+              </a:spcBef>
+              <a:spcAft>
+                <a:spcPts val="0"/>
+              </a:spcAft>
+              <a:buFont typeface="Symbol" panose="05050102010706020507" pitchFamily="18" charset="2"/>
+              <a:buChar char=""/>
+            </a:pPr>
+            <a:r>
+              <a:rPr lang="sr-Cyrl-RS" sz="1600" dirty="0">
+                <a:effectLst/>
+                <a:latin typeface="Times New Roman" panose="02020603050405020304" pitchFamily="18" charset="0"/>
+                <a:ea typeface="Calibri" panose="020F0502020204030204" pitchFamily="34" charset="0"/>
+                <a:cs typeface="Times New Roman" panose="02020603050405020304" pitchFamily="18" charset="0"/>
+              </a:rPr>
+              <a:t>позадинска скрипта </a:t>
+            </a:r>
+            <a:r>
+              <a:rPr lang="en-US" sz="1600" dirty="0">
+                <a:effectLst/>
+                <a:latin typeface="Times New Roman" panose="02020603050405020304" pitchFamily="18" charset="0"/>
+                <a:ea typeface="Calibri" panose="020F0502020204030204" pitchFamily="34" charset="0"/>
+                <a:cs typeface="Times New Roman" panose="02020603050405020304" pitchFamily="18" charset="0"/>
+              </a:rPr>
+              <a:t>(</a:t>
+            </a:r>
+            <a:r>
+              <a:rPr lang="en-US" sz="1600" i="1" dirty="0">
+                <a:effectLst/>
+                <a:latin typeface="Times New Roman" panose="02020603050405020304" pitchFamily="18" charset="0"/>
+                <a:ea typeface="Calibri" panose="020F0502020204030204" pitchFamily="34" charset="0"/>
+                <a:cs typeface="Times New Roman" panose="02020603050405020304" pitchFamily="18" charset="0"/>
+              </a:rPr>
+              <a:t>background.js</a:t>
+            </a:r>
+            <a:r>
+              <a:rPr lang="en-US" sz="1600" dirty="0">
+                <a:effectLst/>
+                <a:latin typeface="Times New Roman" panose="02020603050405020304" pitchFamily="18" charset="0"/>
+                <a:ea typeface="Calibri" panose="020F0502020204030204" pitchFamily="34" charset="0"/>
+                <a:cs typeface="Times New Roman" panose="02020603050405020304" pitchFamily="18" charset="0"/>
+              </a:rPr>
+              <a:t>)</a:t>
+            </a:r>
+          </a:p>
+          <a:p>
+            <a:pPr marL="342900" marR="0" lvl="0" indent="-342900" algn="just">
+              <a:lnSpc>
+                <a:spcPct val="150000"/>
+              </a:lnSpc>
+              <a:spcBef>
+                <a:spcPts val="0"/>
+              </a:spcBef>
+              <a:spcAft>
+                <a:spcPts val="0"/>
+              </a:spcAft>
+              <a:buFont typeface="Symbol" panose="05050102010706020507" pitchFamily="18" charset="2"/>
+              <a:buChar char=""/>
+            </a:pPr>
+            <a:r>
+              <a:rPr lang="sr-Cyrl-RS" sz="1600" dirty="0">
+                <a:effectLst/>
+                <a:latin typeface="Times New Roman" panose="02020603050405020304" pitchFamily="18" charset="0"/>
+                <a:ea typeface="Calibri" panose="020F0502020204030204" pitchFamily="34" charset="0"/>
+                <a:cs typeface="Times New Roman" panose="02020603050405020304" pitchFamily="18" charset="0"/>
+              </a:rPr>
+              <a:t>скрипта садржаја (</a:t>
+            </a:r>
+            <a:r>
+              <a:rPr lang="en-US" sz="1600" i="1" dirty="0">
+                <a:effectLst/>
+                <a:latin typeface="Times New Roman" panose="02020603050405020304" pitchFamily="18" charset="0"/>
+                <a:ea typeface="Calibri" panose="020F0502020204030204" pitchFamily="34" charset="0"/>
+                <a:cs typeface="Times New Roman" panose="02020603050405020304" pitchFamily="18" charset="0"/>
+              </a:rPr>
+              <a:t>content.js</a:t>
+            </a:r>
+            <a:r>
+              <a:rPr lang="sr-Cyrl-RS" sz="1600" dirty="0">
+                <a:effectLst/>
+                <a:latin typeface="Times New Roman" panose="02020603050405020304" pitchFamily="18" charset="0"/>
+                <a:ea typeface="Calibri" panose="020F0502020204030204" pitchFamily="34" charset="0"/>
+                <a:cs typeface="Times New Roman" panose="02020603050405020304" pitchFamily="18" charset="0"/>
+              </a:rPr>
+              <a:t>)</a:t>
+            </a:r>
+            <a:endParaRPr lang="en-US" sz="1600" dirty="0">
+              <a:effectLst/>
+              <a:latin typeface="Times New Roman" panose="02020603050405020304" pitchFamily="18" charset="0"/>
+              <a:ea typeface="Calibri" panose="020F0502020204030204" pitchFamily="34" charset="0"/>
+              <a:cs typeface="Times New Roman" panose="02020603050405020304" pitchFamily="18" charset="0"/>
+            </a:endParaRPr>
+          </a:p>
+          <a:p>
+            <a:pPr marL="342900" marR="0" lvl="0" indent="-342900" algn="just">
+              <a:lnSpc>
+                <a:spcPct val="150000"/>
+              </a:lnSpc>
+              <a:spcBef>
+                <a:spcPts val="0"/>
+              </a:spcBef>
+              <a:spcAft>
+                <a:spcPts val="0"/>
+              </a:spcAft>
+              <a:buFont typeface="Symbol" panose="05050102010706020507" pitchFamily="18" charset="2"/>
+              <a:buChar char=""/>
+            </a:pPr>
+            <a:r>
+              <a:rPr lang="sr-Cyrl-RS" sz="1600" dirty="0">
+                <a:effectLst/>
+                <a:latin typeface="Times New Roman" panose="02020603050405020304" pitchFamily="18" charset="0"/>
+                <a:ea typeface="Calibri" panose="020F0502020204030204" pitchFamily="34" charset="0"/>
+                <a:cs typeface="Times New Roman" panose="02020603050405020304" pitchFamily="18" charset="0"/>
+              </a:rPr>
+              <a:t>додаци</a:t>
+            </a:r>
+            <a:endParaRPr lang="en-US" sz="1600" dirty="0">
+              <a:effectLst/>
+              <a:latin typeface="Times New Roman" panose="02020603050405020304" pitchFamily="18" charset="0"/>
+              <a:ea typeface="Calibri" panose="020F0502020204030204" pitchFamily="34" charset="0"/>
+              <a:cs typeface="Times New Roman" panose="02020603050405020304" pitchFamily="18" charset="0"/>
+            </a:endParaRPr>
+          </a:p>
+          <a:p>
+            <a:pPr marL="0" indent="0">
+              <a:buNone/>
+            </a:pPr>
+            <a:endParaRPr lang="en-US" dirty="0"/>
+          </a:p>
+        </p:txBody>
+      </p:sp>
+      <p:sp>
+        <p:nvSpPr>
+          <p:cNvPr id="4" name="Slide Number Placeholder 3">
+            <a:extLst>
+              <a:ext uri="{FF2B5EF4-FFF2-40B4-BE49-F238E27FC236}">
+                <a16:creationId xmlns:a16="http://schemas.microsoft.com/office/drawing/2014/main" id="{A89399A8-105A-4616-B795-8661357F19D7}"/>
+              </a:ext>
+            </a:extLst>
+          </p:cNvPr>
+          <p:cNvSpPr>
+            <a:spLocks noGrp="1"/>
+          </p:cNvSpPr>
+          <p:nvPr>
+            <p:ph type="sldNum" sz="quarter" idx="12"/>
+          </p:nvPr>
+        </p:nvSpPr>
+        <p:spPr/>
+        <p:txBody>
+          <a:bodyPr/>
+          <a:lstStyle/>
+          <a:p>
+            <a:fld id="{A95D94BB-3F08-4867-8133-8201904E9445}" type="slidenum">
+              <a:rPr lang="en-US" smtClean="0"/>
+              <a:t>11</a:t>
+            </a:fld>
+            <a:endParaRPr lang="en-US"/>
+          </a:p>
+        </p:txBody>
+      </p:sp>
+    </p:spTree>
+    <p:extLst>
+      <p:ext uri="{BB962C8B-B14F-4D97-AF65-F5344CB8AC3E}">
+        <p14:creationId xmlns:p14="http://schemas.microsoft.com/office/powerpoint/2010/main" val="3199622299"/>
+      </p:ext>
+    </p:extLst>
+  </p:cSld>
+  <p:clrMapOvr>
+    <a:masterClrMapping/>
+  </p:clrMapOvr>
+</p:sld>
+</file>
+
+<file path=ppt/slides/slide12.xml><?xml version="1.0" encoding="utf-8"?>
+<p:sld xmlns:a="http://schemas.openxmlformats.org/drawingml/2006/main" xmlns:r="http://schemas.openxmlformats.org/officeDocument/2006/relationships" xmlns:p="http://schemas.openxmlformats.org/presentationml/2006/main">
+  <p:cSld>
+    <p:spTree>
+      <p:nvGrpSpPr>
+        <p:cNvPr id="1" name=""/>
+        <p:cNvGrpSpPr/>
+        <p:nvPr/>
+      </p:nvGrpSpPr>
+      <p:grpSpPr>
+        <a:xfrm>
+          <a:off x="0" y="0"/>
+          <a:ext cx="0" cy="0"/>
+          <a:chOff x="0" y="0"/>
+          <a:chExt cx="0" cy="0"/>
+        </a:xfrm>
+      </p:grpSpPr>
+      <p:sp>
+        <p:nvSpPr>
+          <p:cNvPr id="2" name="Title 1">
+            <a:extLst>
+              <a:ext uri="{FF2B5EF4-FFF2-40B4-BE49-F238E27FC236}">
+                <a16:creationId xmlns:a16="http://schemas.microsoft.com/office/drawing/2014/main" id="{A2FA89DD-D423-4F27-B8B1-A989758B3B6B}"/>
+              </a:ext>
+            </a:extLst>
+          </p:cNvPr>
+          <p:cNvSpPr>
+            <a:spLocks noGrp="1"/>
+          </p:cNvSpPr>
+          <p:nvPr>
+            <p:ph type="title"/>
+          </p:nvPr>
+        </p:nvSpPr>
+        <p:spPr/>
+        <p:txBody>
+          <a:bodyPr/>
+          <a:lstStyle/>
+          <a:p>
+            <a:r>
+              <a:rPr lang="sr-Cyrl-RS" b="1" dirty="0"/>
+              <a:t>Закључак</a:t>
+            </a:r>
+            <a:endParaRPr lang="en-US" b="1" dirty="0"/>
+          </a:p>
+        </p:txBody>
+      </p:sp>
+      <p:sp>
+        <p:nvSpPr>
+          <p:cNvPr id="3" name="Content Placeholder 2">
+            <a:extLst>
+              <a:ext uri="{FF2B5EF4-FFF2-40B4-BE49-F238E27FC236}">
+                <a16:creationId xmlns:a16="http://schemas.microsoft.com/office/drawing/2014/main" id="{BDF49E10-9BBD-45C3-A618-F91BEE8C4A88}"/>
+              </a:ext>
+            </a:extLst>
+          </p:cNvPr>
+          <p:cNvSpPr>
+            <a:spLocks noGrp="1"/>
+          </p:cNvSpPr>
+          <p:nvPr>
+            <p:ph idx="1"/>
+          </p:nvPr>
+        </p:nvSpPr>
+        <p:spPr>
+          <a:xfrm>
+            <a:off x="838200" y="1758156"/>
+            <a:ext cx="10515600" cy="4530725"/>
+          </a:xfrm>
+        </p:spPr>
+        <p:txBody>
+          <a:bodyPr>
+            <a:normAutofit/>
+          </a:bodyPr>
+          <a:lstStyle/>
+          <a:p>
+            <a:r>
+              <a:rPr lang="sr-Cyrl-RS" dirty="0"/>
+              <a:t>Екстензије прилагођавају рад веб прегледача</a:t>
+            </a:r>
+          </a:p>
+          <a:p>
+            <a:r>
+              <a:rPr lang="sr-Cyrl-RS" dirty="0"/>
+              <a:t>Екстензије су изграђене помоћу веб технологија – </a:t>
+            </a:r>
+            <a:r>
+              <a:rPr lang="en-US" i="1" dirty="0"/>
+              <a:t>HTML, CSS, JS</a:t>
+            </a:r>
+          </a:p>
+          <a:p>
+            <a:r>
+              <a:rPr lang="sr-Cyrl-RS" dirty="0"/>
+              <a:t>Приказана је израда екстензије која омогућава:</a:t>
+            </a:r>
+          </a:p>
+          <a:p>
+            <a:pPr lvl="1"/>
+            <a:r>
+              <a:rPr lang="sr-Cyrl-RS" dirty="0"/>
+              <a:t>креирање подсетника за одложено читање порука електронске поште</a:t>
+            </a:r>
+          </a:p>
+          <a:p>
+            <a:pPr lvl="1"/>
+            <a:r>
+              <a:rPr lang="sr-Cyrl-RS" dirty="0"/>
+              <a:t>управљање подсетницима</a:t>
+            </a:r>
+          </a:p>
+          <a:p>
+            <a:pPr lvl="1"/>
+            <a:r>
+              <a:rPr lang="sr-Cyrl-RS" dirty="0"/>
+              <a:t>обавештавање о подсетнику</a:t>
+            </a:r>
+          </a:p>
+          <a:p>
+            <a:r>
+              <a:rPr lang="sr-Cyrl-RS" dirty="0"/>
+              <a:t>Тренутно стање – подршка једног веб прегледача – </a:t>
+            </a:r>
+            <a:r>
+              <a:rPr lang="en-US" i="1" dirty="0"/>
+              <a:t>Google Chrome</a:t>
+            </a:r>
+            <a:endParaRPr lang="sr-Cyrl-RS" dirty="0"/>
+          </a:p>
+          <a:p>
+            <a:r>
+              <a:rPr lang="sr-Cyrl-RS" dirty="0"/>
+              <a:t>Проширењ</a:t>
+            </a:r>
+            <a:r>
+              <a:rPr lang="en-US" dirty="0"/>
+              <a:t>a:</a:t>
+            </a:r>
+          </a:p>
+          <a:p>
+            <a:pPr lvl="1"/>
+            <a:r>
+              <a:rPr lang="sr-Cyrl-RS" dirty="0"/>
+              <a:t>подршка више веб прегледача, нпр. </a:t>
+            </a:r>
+            <a:r>
+              <a:rPr lang="en-US" i="1" dirty="0"/>
+              <a:t>Firefox by Mozilla</a:t>
+            </a:r>
+            <a:r>
+              <a:rPr lang="sr-Cyrl-RS" dirty="0"/>
+              <a:t> и</a:t>
+            </a:r>
+            <a:r>
+              <a:rPr lang="en-US" i="1" dirty="0"/>
+              <a:t> Opera</a:t>
+            </a:r>
+          </a:p>
+          <a:p>
+            <a:pPr lvl="1"/>
+            <a:r>
+              <a:rPr lang="sr-Cyrl-RS" dirty="0"/>
+              <a:t>отварање конкретне поруке е-поште притиском на обавештење</a:t>
+            </a:r>
+          </a:p>
+        </p:txBody>
+      </p:sp>
+      <p:sp>
+        <p:nvSpPr>
+          <p:cNvPr id="4" name="Slide Number Placeholder 3">
+            <a:extLst>
+              <a:ext uri="{FF2B5EF4-FFF2-40B4-BE49-F238E27FC236}">
+                <a16:creationId xmlns:a16="http://schemas.microsoft.com/office/drawing/2014/main" id="{41C68F98-7CB0-46E7-8EFF-E2F39A141F5D}"/>
+              </a:ext>
+            </a:extLst>
+          </p:cNvPr>
+          <p:cNvSpPr>
+            <a:spLocks noGrp="1"/>
+          </p:cNvSpPr>
+          <p:nvPr>
+            <p:ph type="sldNum" sz="quarter" idx="12"/>
+          </p:nvPr>
+        </p:nvSpPr>
+        <p:spPr/>
+        <p:txBody>
+          <a:bodyPr/>
+          <a:lstStyle/>
+          <a:p>
+            <a:fld id="{A95D94BB-3F08-4867-8133-8201904E9445}" type="slidenum">
+              <a:rPr lang="en-US" smtClean="0"/>
+              <a:t>12</a:t>
+            </a:fld>
+            <a:endParaRPr lang="en-US"/>
+          </a:p>
+        </p:txBody>
+      </p:sp>
+    </p:spTree>
+    <p:extLst>
+      <p:ext uri="{BB962C8B-B14F-4D97-AF65-F5344CB8AC3E}">
+        <p14:creationId xmlns:p14="http://schemas.microsoft.com/office/powerpoint/2010/main" val="851667399"/>
+      </p:ext>
+    </p:extLst>
+  </p:cSld>
+  <p:clrMapOvr>
+    <a:masterClrMapping/>
+  </p:clrMapOvr>
+</p:sld>
+</file>
+
+<file path=ppt/slides/slide13.xml><?xml version="1.0" encoding="utf-8"?>
+<p:sld xmlns:a="http://schemas.openxmlformats.org/drawingml/2006/main" xmlns:r="http://schemas.openxmlformats.org/officeDocument/2006/relationships" xmlns:p="http://schemas.openxmlformats.org/presentationml/2006/main">
+  <p:cSld>
+    <p:spTree>
+      <p:nvGrpSpPr>
+        <p:cNvPr id="1" name=""/>
+        <p:cNvGrpSpPr/>
+        <p:nvPr/>
+      </p:nvGrpSpPr>
+      <p:grpSpPr>
+        <a:xfrm>
+          <a:off x="0" y="0"/>
+          <a:ext cx="0" cy="0"/>
+          <a:chOff x="0" y="0"/>
+          <a:chExt cx="0" cy="0"/>
+        </a:xfrm>
+      </p:grpSpPr>
+      <p:sp>
+        <p:nvSpPr>
+          <p:cNvPr id="2" name="Title 1">
+            <a:extLst>
+              <a:ext uri="{FF2B5EF4-FFF2-40B4-BE49-F238E27FC236}">
+                <a16:creationId xmlns:a16="http://schemas.microsoft.com/office/drawing/2014/main" id="{9C9D67C1-B666-4153-81BF-52E4F2DDDD1E}"/>
+              </a:ext>
+            </a:extLst>
+          </p:cNvPr>
+          <p:cNvSpPr>
+            <a:spLocks noGrp="1"/>
+          </p:cNvSpPr>
+          <p:nvPr>
+            <p:ph type="title"/>
+          </p:nvPr>
+        </p:nvSpPr>
+        <p:spPr>
+          <a:xfrm>
+            <a:off x="863338" y="970736"/>
+            <a:ext cx="10515600" cy="1325563"/>
+          </a:xfrm>
+        </p:spPr>
+        <p:txBody>
+          <a:bodyPr/>
+          <a:lstStyle/>
+          <a:p>
+            <a:pPr algn="ctr"/>
+            <a:r>
+              <a:rPr lang="sr-Cyrl-RS" dirty="0"/>
+              <a:t>Хвала на пажњи и срећни празници!</a:t>
+            </a:r>
+            <a:endParaRPr lang="en-US" dirty="0"/>
+          </a:p>
+        </p:txBody>
+      </p:sp>
+      <p:sp>
+        <p:nvSpPr>
+          <p:cNvPr id="3" name="Content Placeholder 2">
+            <a:extLst>
+              <a:ext uri="{FF2B5EF4-FFF2-40B4-BE49-F238E27FC236}">
+                <a16:creationId xmlns:a16="http://schemas.microsoft.com/office/drawing/2014/main" id="{D866DD0C-75FB-4E6D-B6DD-162B0CA9A9DC}"/>
+              </a:ext>
+            </a:extLst>
+          </p:cNvPr>
+          <p:cNvSpPr>
+            <a:spLocks noGrp="1"/>
+          </p:cNvSpPr>
+          <p:nvPr>
+            <p:ph idx="1"/>
+          </p:nvPr>
+        </p:nvSpPr>
+        <p:spPr>
+          <a:xfrm>
+            <a:off x="5326686" y="2484531"/>
+            <a:ext cx="1538627" cy="944469"/>
+          </a:xfrm>
+        </p:spPr>
+        <p:txBody>
+          <a:bodyPr/>
+          <a:lstStyle/>
+          <a:p>
+            <a:pPr marL="0" indent="0">
+              <a:buNone/>
+            </a:pPr>
+            <a:r>
+              <a:rPr lang="sr-Cyrl-RS" dirty="0"/>
+              <a:t>Питања?</a:t>
+            </a:r>
+            <a:endParaRPr lang="en-US" dirty="0"/>
+          </a:p>
+        </p:txBody>
+      </p:sp>
+      <p:sp>
+        <p:nvSpPr>
+          <p:cNvPr id="4" name="Slide Number Placeholder 3">
+            <a:extLst>
+              <a:ext uri="{FF2B5EF4-FFF2-40B4-BE49-F238E27FC236}">
+                <a16:creationId xmlns:a16="http://schemas.microsoft.com/office/drawing/2014/main" id="{2CA272C5-B256-4AA6-B329-5B49190A8BD8}"/>
+              </a:ext>
+            </a:extLst>
+          </p:cNvPr>
+          <p:cNvSpPr>
+            <a:spLocks noGrp="1"/>
+          </p:cNvSpPr>
+          <p:nvPr>
+            <p:ph type="sldNum" sz="quarter" idx="12"/>
+          </p:nvPr>
+        </p:nvSpPr>
+        <p:spPr/>
+        <p:txBody>
+          <a:bodyPr/>
+          <a:lstStyle/>
+          <a:p>
+            <a:fld id="{A95D94BB-3F08-4867-8133-8201904E9445}" type="slidenum">
+              <a:rPr lang="en-US" smtClean="0"/>
+              <a:t>13</a:t>
+            </a:fld>
+            <a:endParaRPr lang="en-US"/>
+          </a:p>
+        </p:txBody>
+      </p:sp>
+      <p:pic>
+        <p:nvPicPr>
+          <p:cNvPr id="6" name="Picture 5" descr="A christmas tree with presents underneath&#10;&#10;Description automatically generated with low confidence">
+            <a:extLst>
+              <a:ext uri="{FF2B5EF4-FFF2-40B4-BE49-F238E27FC236}">
+                <a16:creationId xmlns:a16="http://schemas.microsoft.com/office/drawing/2014/main" id="{1A3CD17C-C4DE-427F-B4EB-27580BB4BC2C}"/>
+              </a:ext>
+            </a:extLst>
+          </p:cNvPr>
+          <p:cNvPicPr>
+            <a:picLocks noChangeAspect="1"/>
+          </p:cNvPicPr>
+          <p:nvPr/>
+        </p:nvPicPr>
+        <p:blipFill>
+          <a:blip r:embed="rId2">
+            <a:extLst>
+              <a:ext uri="{28A0092B-C50C-407E-A947-70E740481C1C}">
+                <a14:useLocalDpi xmlns:a14="http://schemas.microsoft.com/office/drawing/2010/main" val="0"/>
+              </a:ext>
+            </a:extLst>
+          </a:blip>
+          <a:stretch>
+            <a:fillRect/>
+          </a:stretch>
+        </p:blipFill>
+        <p:spPr>
+          <a:xfrm>
+            <a:off x="7846771" y="2135064"/>
+            <a:ext cx="3069468" cy="4339749"/>
+          </a:xfrm>
+          <a:prstGeom prst="rect">
+            <a:avLst/>
+          </a:prstGeom>
+        </p:spPr>
+      </p:pic>
+      <p:pic>
+        <p:nvPicPr>
+          <p:cNvPr id="9" name="Picture 8" descr="A picture containing headdress, helmet&#10;&#10;Description automatically generated">
+            <a:extLst>
+              <a:ext uri="{FF2B5EF4-FFF2-40B4-BE49-F238E27FC236}">
+                <a16:creationId xmlns:a16="http://schemas.microsoft.com/office/drawing/2014/main" id="{C39D6CE8-8904-4E51-9E8D-EACC475D8295}"/>
+              </a:ext>
+            </a:extLst>
+          </p:cNvPr>
+          <p:cNvPicPr>
+            <a:picLocks noChangeAspect="1"/>
+          </p:cNvPicPr>
+          <p:nvPr/>
+        </p:nvPicPr>
+        <p:blipFill>
+          <a:blip r:embed="rId3">
+            <a:extLst>
+              <a:ext uri="{BEBA8EAE-BF5A-486C-A8C5-ECC9F3942E4B}">
+                <a14:imgProps xmlns:a14="http://schemas.microsoft.com/office/drawing/2010/main">
+                  <a14:imgLayer r:embed="rId4">
+                    <a14:imgEffect>
+                      <a14:backgroundRemoval t="10000" b="90000" l="10000" r="90000"/>
+                    </a14:imgEffect>
+                  </a14:imgLayer>
+                </a14:imgProps>
+              </a:ext>
+              <a:ext uri="{28A0092B-C50C-407E-A947-70E740481C1C}">
+                <a14:useLocalDpi xmlns:a14="http://schemas.microsoft.com/office/drawing/2010/main" val="0"/>
+              </a:ext>
+            </a:extLst>
+          </a:blip>
+          <a:stretch>
+            <a:fillRect/>
+          </a:stretch>
+        </p:blipFill>
+        <p:spPr>
+          <a:xfrm>
+            <a:off x="743979" y="594887"/>
+            <a:ext cx="1749654" cy="1197019"/>
+          </a:xfrm>
+          <a:prstGeom prst="rect">
+            <a:avLst/>
+          </a:prstGeom>
+        </p:spPr>
+      </p:pic>
+    </p:spTree>
+    <p:extLst>
+      <p:ext uri="{BB962C8B-B14F-4D97-AF65-F5344CB8AC3E}">
+        <p14:creationId xmlns:p14="http://schemas.microsoft.com/office/powerpoint/2010/main" val="4238611157"/>
+      </p:ext>
+    </p:extLst>
+  </p:cSld>
+  <p:clrMapOvr>
+    <a:masterClrMapping/>
+  </p:clrMapOvr>
+</p:sld>
+</file>
+
 <file path=ppt/slides/slide2.xml><?xml version="1.0" encoding="utf-8"?>
 <p:sld xmlns:a="http://schemas.openxmlformats.org/drawingml/2006/main" xmlns:r="http://schemas.openxmlformats.org/officeDocument/2006/relationships" xmlns:p="http://schemas.openxmlformats.org/presentationml/2006/main">
   <p:cSld>
@@ -4299,7 +5356,7 @@
                 <a:latin typeface="Times New Roman" panose="02020603050405020304" pitchFamily="18" charset="0"/>
                 <a:ea typeface="Calibri" panose="020F0502020204030204" pitchFamily="34" charset="0"/>
               </a:rPr>
-              <a:t>Могућности екстензија:</a:t>
+              <a:t>Могућности екстензије:</a:t>
             </a:r>
             <a:endParaRPr lang="sr-Cyrl-RS" sz="2400" dirty="0">
               <a:effectLst/>
@@ -4581,7 +5638,7 @@
           <a:p>
             <a:r>
               <a:rPr lang="sr-Cyrl-RS" dirty="0"/>
-              <a:t>Екстензије:</a:t>
+              <a:t>Популарне екстензије:</a:t>
             </a:r>
           </a:p>
           <a:p>
@@ -4734,7 +5791,7 @@
         </p:spPr>
         <p:txBody>
           <a:bodyPr>
-            <a:normAutofit lnSpcReduction="10000"/>
+            <a:normAutofit/>
           </a:bodyPr>
           <a:lstStyle/>
           <a:p>
@@ -4745,13 +5802,6 @@
             <a:r>
               <a:rPr lang="en-US" i="1" dirty="0"/>
               <a:t>HTML, CSS, JavaScript</a:t>
-            </a:r>
-            <a:endParaRPr lang="sr-Cyrl-RS" dirty="0"/>
-          </a:p>
-          <a:p>
-            <a:r>
-              <a:rPr lang="sr-Cyrl-RS" dirty="0"/>
-              <a:t>Кориснички интерфејс + АПИ</a:t>
             </a:r>
           </a:p>
           <a:p>
@@ -4926,31 +5976,41 @@
           </a:p>
         </p:txBody>
       </p:sp>
-      <p:sp>
-        <p:nvSpPr>
-          <p:cNvPr id="3" name="Content Placeholder 2">
-            <a:extLst>
-              <a:ext uri="{FF2B5EF4-FFF2-40B4-BE49-F238E27FC236}">
-                <a16:creationId xmlns:a16="http://schemas.microsoft.com/office/drawing/2014/main" id="{EF0C4EBB-22DC-4B36-A882-8A0E22A6A31E}"/>
-              </a:ext>
-            </a:extLst>
-          </p:cNvPr>
-          <p:cNvSpPr>
-            <a:spLocks noGrp="1"/>
-          </p:cNvSpPr>
+      <p:pic>
+        <p:nvPicPr>
+          <p:cNvPr id="6" name="Content Placeholder 5" descr="Graphical user interface, text, application&#10;&#10;Description automatically generated">
+            <a:extLst>
+              <a:ext uri="{FF2B5EF4-FFF2-40B4-BE49-F238E27FC236}">
+                <a16:creationId xmlns:a16="http://schemas.microsoft.com/office/drawing/2014/main" id="{918C3B38-9761-4E1B-A126-9E68972F7B5C}"/>
+              </a:ext>
+            </a:extLst>
+          </p:cNvPr>
+          <p:cNvPicPr>
+            <a:picLocks noGrp="1" noChangeAspect="1"/>
+          </p:cNvPicPr>
           <p:nvPr>
             <p:ph idx="1"/>
           </p:nvPr>
-        </p:nvSpPr>
-        <p:spPr/>
-        <p:txBody>
-          <a:bodyPr/>
-          <a:lstStyle/>
-          <a:p>
-            <a:endParaRPr lang="en-US"/>
-          </a:p>
-        </p:txBody>
-      </p:sp>
+        </p:nvPicPr>
+        <p:blipFill>
+          <a:blip r:embed="rId2">
+            <a:extLst>
+              <a:ext uri="{28A0092B-C50C-407E-A947-70E740481C1C}">
+                <a14:useLocalDpi xmlns:a14="http://schemas.microsoft.com/office/drawing/2010/main" val="0"/>
+              </a:ext>
+            </a:extLst>
+          </a:blip>
+          <a:stretch>
+            <a:fillRect/>
+          </a:stretch>
+        </p:blipFill>
+        <p:spPr>
+          <a:xfrm>
+            <a:off x="281314" y="2002244"/>
+            <a:ext cx="5582957" cy="2853511"/>
+          </a:xfrm>
+        </p:spPr>
+      </p:pic>
       <p:sp>
         <p:nvSpPr>
           <p:cNvPr id="4" name="Slide Number Placeholder 3">
@@ -4980,6 +6040,42 @@
           </a:p>
         </p:txBody>
       </p:sp>
+      <p:pic>
+        <p:nvPicPr>
+          <p:cNvPr id="8" name="Picture 7" descr="Graphical user interface, text, application&#10;&#10;Description automatically generated">
+            <a:extLst>
+              <a:ext uri="{FF2B5EF4-FFF2-40B4-BE49-F238E27FC236}">
+                <a16:creationId xmlns:a16="http://schemas.microsoft.com/office/drawing/2014/main" id="{7AAFB497-1DCB-4AEA-87F1-63B2C87F4D3F}"/>
+              </a:ext>
+            </a:extLst>
+          </p:cNvPr>
+          <p:cNvPicPr>
+            <a:picLocks noChangeAspect="1"/>
+          </p:cNvPicPr>
+          <p:nvPr/>
+        </p:nvPicPr>
+        <p:blipFill>
+          <a:blip r:embed="rId3">
+            <a:extLst>
+              <a:ext uri="{28A0092B-C50C-407E-A947-70E740481C1C}">
+                <a14:useLocalDpi xmlns:a14="http://schemas.microsoft.com/office/drawing/2010/main" val="0"/>
+              </a:ext>
+            </a:extLst>
+          </a:blip>
+          <a:stretch>
+            <a:fillRect/>
+          </a:stretch>
+        </p:blipFill>
+        <p:spPr>
+          <a:xfrm>
+            <a:off x="6096000" y="2201034"/>
+            <a:ext cx="5814686" cy="1579116"/>
+          </a:xfrm>
+          <a:prstGeom prst="rect">
+            <a:avLst/>
+          </a:prstGeom>
+        </p:spPr>
+      </p:pic>
     </p:spTree>
     <p:extLst>
       <p:ext uri="{BB962C8B-B14F-4D97-AF65-F5344CB8AC3E}">
@@ -5010,66 +6106,47 @@
           <a:chExt cx="0" cy="0"/>
         </a:xfrm>
       </p:grpSpPr>
-      <p:sp>
-        <p:nvSpPr>
-          <p:cNvPr id="2" name="Title 1">
-            <a:extLst>
-              <a:ext uri="{FF2B5EF4-FFF2-40B4-BE49-F238E27FC236}">
-                <a16:creationId xmlns:a16="http://schemas.microsoft.com/office/drawing/2014/main" id="{154B8461-21EA-44A9-A4F3-2D88009D6BDB}"/>
-              </a:ext>
-            </a:extLst>
-          </p:cNvPr>
-          <p:cNvSpPr>
-            <a:spLocks noGrp="1"/>
-          </p:cNvSpPr>
-          <p:nvPr>
-            <p:ph type="title"/>
-          </p:nvPr>
-        </p:nvSpPr>
-        <p:spPr/>
-        <p:txBody>
-          <a:bodyPr/>
-          <a:lstStyle/>
-          <a:p>
-            <a:r>
-              <a:rPr lang="sr-Cyrl-RS" b="1" dirty="0"/>
-              <a:t>Реализација система</a:t>
-            </a:r>
-            <a:endParaRPr lang="en-US" b="1" dirty="0"/>
-          </a:p>
-        </p:txBody>
-      </p:sp>
-      <p:sp>
-        <p:nvSpPr>
-          <p:cNvPr id="3" name="Content Placeholder 2">
-            <a:extLst>
-              <a:ext uri="{FF2B5EF4-FFF2-40B4-BE49-F238E27FC236}">
-                <a16:creationId xmlns:a16="http://schemas.microsoft.com/office/drawing/2014/main" id="{814E04A5-9573-4459-944A-B657D252DF7B}"/>
-              </a:ext>
-            </a:extLst>
-          </p:cNvPr>
-          <p:cNvSpPr>
-            <a:spLocks noGrp="1"/>
-          </p:cNvSpPr>
+      <p:pic>
+        <p:nvPicPr>
+          <p:cNvPr id="6" name="Content Placeholder 5" descr="Graphical user interface, text, application&#10;&#10;Description automatically generated">
+            <a:extLst>
+              <a:ext uri="{FF2B5EF4-FFF2-40B4-BE49-F238E27FC236}">
+                <a16:creationId xmlns:a16="http://schemas.microsoft.com/office/drawing/2014/main" id="{E412C0EC-585D-42D0-94FB-B4DCD62FBAD7}"/>
+              </a:ext>
+            </a:extLst>
+          </p:cNvPr>
+          <p:cNvPicPr>
+            <a:picLocks noGrp="1" noChangeAspect="1"/>
+          </p:cNvPicPr>
           <p:nvPr>
             <p:ph idx="1"/>
           </p:nvPr>
-        </p:nvSpPr>
-        <p:spPr/>
-        <p:txBody>
-          <a:bodyPr/>
-          <a:lstStyle/>
-          <a:p>
-            <a:endParaRPr lang="en-US"/>
-          </a:p>
-        </p:txBody>
-      </p:sp>
+        </p:nvPicPr>
+        <p:blipFill>
+          <a:blip r:embed="rId2">
+            <a:extLst>
+              <a:ext uri="{28A0092B-C50C-407E-A947-70E740481C1C}">
+                <a14:useLocalDpi xmlns:a14="http://schemas.microsoft.com/office/drawing/2010/main" val="0"/>
+              </a:ext>
+            </a:extLst>
+          </a:blip>
+          <a:stretch>
+            <a:fillRect/>
+          </a:stretch>
+        </p:blipFill>
+        <p:spPr>
+          <a:xfrm>
+            <a:off x="831647" y="1263920"/>
+            <a:ext cx="10154466" cy="4849495"/>
+          </a:xfrm>
+        </p:spPr>
+      </p:pic>
       <p:sp>
         <p:nvSpPr>
           <p:cNvPr id="4" name="Slide Number Placeholder 3">
             <a:extLst>
               <a:ext uri="{FF2B5EF4-FFF2-40B4-BE49-F238E27FC236}">
-                <a16:creationId xmlns:a16="http://schemas.microsoft.com/office/drawing/2014/main" id="{A89399A8-105A-4616-B795-8661357F19D7}"/>
+                <a16:creationId xmlns:a16="http://schemas.microsoft.com/office/drawing/2014/main" id="{D79A87A6-CE6F-42D4-B130-ECEED1D0BCD7}"/>
               </a:ext>
             </a:extLst>
           </p:cNvPr>
@@ -5093,10 +6170,46 @@
           </a:p>
         </p:txBody>
       </p:sp>
+      <p:sp>
+        <p:nvSpPr>
+          <p:cNvPr id="7" name="TextBox 6">
+            <a:extLst>
+              <a:ext uri="{FF2B5EF4-FFF2-40B4-BE49-F238E27FC236}">
+                <a16:creationId xmlns:a16="http://schemas.microsoft.com/office/drawing/2014/main" id="{E382134A-AC0A-4D37-969F-B2E07E0D7783}"/>
+              </a:ext>
+            </a:extLst>
+          </p:cNvPr>
+          <p:cNvSpPr txBox="1"/>
+          <p:nvPr/>
+        </p:nvSpPr>
+        <p:spPr>
+          <a:xfrm>
+            <a:off x="980388" y="559919"/>
+            <a:ext cx="8116478" cy="461665"/>
+          </a:xfrm>
+          <a:prstGeom prst="rect">
+            <a:avLst/>
+          </a:prstGeom>
+          <a:noFill/>
+        </p:spPr>
+        <p:txBody>
+          <a:bodyPr wrap="square" rtlCol="0">
+            <a:spAutoFit/>
+          </a:bodyPr>
+          <a:lstStyle/>
+          <a:p>
+            <a:r>
+              <a:rPr lang="sr-Cyrl-RS" sz="2400" dirty="0"/>
+              <a:t>Страница са опцијама – без креираних подсетника</a:t>
+            </a:r>
+            <a:endParaRPr lang="en-US" sz="2400" dirty="0"/>
+          </a:p>
+        </p:txBody>
+      </p:sp>
     </p:spTree>
     <p:extLst>
       <p:ext uri="{BB962C8B-B14F-4D97-AF65-F5344CB8AC3E}">
-        <p14:creationId xmlns:p14="http://schemas.microsoft.com/office/powerpoint/2010/main" val="3199622299"/>
+        <p14:creationId xmlns:p14="http://schemas.microsoft.com/office/powerpoint/2010/main" val="3355456087"/>
       </p:ext>
     </p:extLst>
   </p:cSld>
@@ -5125,158 +6238,10 @@
       </p:grpSpPr>
       <p:sp>
         <p:nvSpPr>
-          <p:cNvPr id="2" name="Title 1">
-            <a:extLst>
-              <a:ext uri="{FF2B5EF4-FFF2-40B4-BE49-F238E27FC236}">
-                <a16:creationId xmlns:a16="http://schemas.microsoft.com/office/drawing/2014/main" id="{A2FA89DD-D423-4F27-B8B1-A989758B3B6B}"/>
-              </a:ext>
-            </a:extLst>
-          </p:cNvPr>
-          <p:cNvSpPr>
-            <a:spLocks noGrp="1"/>
-          </p:cNvSpPr>
-          <p:nvPr>
-            <p:ph type="title"/>
-          </p:nvPr>
-        </p:nvSpPr>
-        <p:spPr/>
-        <p:txBody>
-          <a:bodyPr/>
-          <a:lstStyle/>
-          <a:p>
-            <a:r>
-              <a:rPr lang="sr-Cyrl-RS" b="1" dirty="0"/>
-              <a:t>Закључак</a:t>
-            </a:r>
-            <a:endParaRPr lang="en-US" b="1" dirty="0"/>
-          </a:p>
-        </p:txBody>
-      </p:sp>
-      <p:sp>
-        <p:nvSpPr>
-          <p:cNvPr id="3" name="Content Placeholder 2">
-            <a:extLst>
-              <a:ext uri="{FF2B5EF4-FFF2-40B4-BE49-F238E27FC236}">
-                <a16:creationId xmlns:a16="http://schemas.microsoft.com/office/drawing/2014/main" id="{BDF49E10-9BBD-45C3-A618-F91BEE8C4A88}"/>
-              </a:ext>
-            </a:extLst>
-          </p:cNvPr>
-          <p:cNvSpPr>
-            <a:spLocks noGrp="1"/>
-          </p:cNvSpPr>
-          <p:nvPr>
-            <p:ph idx="1"/>
-          </p:nvPr>
-        </p:nvSpPr>
-        <p:spPr>
-          <a:xfrm>
-            <a:off x="838200" y="1758156"/>
-            <a:ext cx="10515600" cy="4530725"/>
-          </a:xfrm>
-        </p:spPr>
-        <p:txBody>
-          <a:bodyPr>
-            <a:normAutofit/>
-          </a:bodyPr>
-          <a:lstStyle/>
-          <a:p>
-            <a:r>
-              <a:rPr lang="sr-Cyrl-RS" dirty="0"/>
-              <a:t>Екстензије прилагођавају рад веб прегледача</a:t>
-            </a:r>
-          </a:p>
-          <a:p>
-            <a:r>
-              <a:rPr lang="sr-Cyrl-RS" dirty="0"/>
-              <a:t>Екстензије су изграђене помоћу веб технологија – </a:t>
-            </a:r>
-            <a:r>
-              <a:rPr lang="en-US" i="1" dirty="0"/>
-              <a:t>HTML, CSS, JS</a:t>
-            </a:r>
-          </a:p>
-          <a:p>
-            <a:r>
-              <a:rPr lang="sr-Cyrl-RS" dirty="0"/>
-              <a:t>Приказана је израда екстензије која омогућава:</a:t>
-            </a:r>
-          </a:p>
-          <a:p>
-            <a:pPr lvl="1"/>
-            <a:r>
-              <a:rPr lang="sr-Cyrl-RS" dirty="0"/>
-              <a:t>креирање подсетника за одложено читање порука електронске поште</a:t>
-            </a:r>
-          </a:p>
-          <a:p>
-            <a:pPr lvl="1"/>
-            <a:r>
-              <a:rPr lang="sr-Cyrl-RS" dirty="0"/>
-              <a:t>управљање подсетницима</a:t>
-            </a:r>
-          </a:p>
-          <a:p>
-            <a:pPr lvl="1"/>
-            <a:r>
-              <a:rPr lang="sr-Cyrl-RS" dirty="0"/>
-              <a:t>обавештавање о подсетнику</a:t>
-            </a:r>
-          </a:p>
-          <a:p>
-            <a:r>
-              <a:rPr lang="sr-Cyrl-RS" dirty="0"/>
-              <a:t>Тренутно стање – подршка једног веб прегледача – </a:t>
-            </a:r>
-            <a:r>
-              <a:rPr lang="en-US" i="1" dirty="0"/>
-              <a:t>Google Chrome</a:t>
-            </a:r>
-            <a:endParaRPr lang="sr-Cyrl-RS" dirty="0"/>
-          </a:p>
-          <a:p>
-            <a:r>
-              <a:rPr lang="sr-Cyrl-RS" dirty="0"/>
-              <a:t>Проширењ</a:t>
-            </a:r>
-            <a:r>
-              <a:rPr lang="en-US" dirty="0"/>
-              <a:t>a:</a:t>
-            </a:r>
-          </a:p>
-          <a:p>
-            <a:pPr lvl="1"/>
-            <a:r>
-              <a:rPr lang="sr-Cyrl-RS" dirty="0"/>
-              <a:t>подршка више веб прегледача, нпр. </a:t>
-            </a:r>
-            <a:r>
-              <a:rPr lang="en-US" i="1" dirty="0"/>
-              <a:t>Firefox by Mozilla</a:t>
-            </a:r>
-            <a:r>
-              <a:rPr lang="sr-Cyrl-RS" dirty="0"/>
-              <a:t> и</a:t>
-            </a:r>
-            <a:r>
-              <a:rPr lang="en-US" i="1" dirty="0"/>
-              <a:t> Opera</a:t>
-            </a:r>
-          </a:p>
-          <a:p>
-            <a:pPr lvl="1"/>
-            <a:r>
-              <a:rPr lang="sr-Cyrl-RS" dirty="0"/>
-              <a:t>отварање конкретне поруке е-поште притиском на обавештење</a:t>
-            </a:r>
-          </a:p>
-        </p:txBody>
-      </p:sp>
-      <p:sp>
-        <p:nvSpPr>
           <p:cNvPr id="4" name="Slide Number Placeholder 3">
             <a:extLst>
               <a:ext uri="{FF2B5EF4-FFF2-40B4-BE49-F238E27FC236}">
-                <a16:creationId xmlns:a16="http://schemas.microsoft.com/office/drawing/2014/main" id="{41C68F98-7CB0-46E7-8EFF-E2F39A141F5D}"/>
+                <a16:creationId xmlns:a16="http://schemas.microsoft.com/office/drawing/2014/main" id="{3D9FD78B-6799-4DAE-A5F2-F7648D28E842}"/>
               </a:ext>
             </a:extLst>
           </p:cNvPr>
@@ -5300,10 +6265,154 @@
           </a:p>
         </p:txBody>
       </p:sp>
+      <p:pic>
+        <p:nvPicPr>
+          <p:cNvPr id="6" name="Picture 5" descr="Graphical user interface, text&#10;&#10;Description automatically generated">
+            <a:extLst>
+              <a:ext uri="{FF2B5EF4-FFF2-40B4-BE49-F238E27FC236}">
+                <a16:creationId xmlns:a16="http://schemas.microsoft.com/office/drawing/2014/main" id="{735BE8C2-87C2-4B85-9CB8-8740221B071D}"/>
+              </a:ext>
+            </a:extLst>
+          </p:cNvPr>
+          <p:cNvPicPr>
+            <a:picLocks noChangeAspect="1"/>
+          </p:cNvPicPr>
+          <p:nvPr/>
+        </p:nvPicPr>
+        <p:blipFill>
+          <a:blip r:embed="rId2">
+            <a:extLst>
+              <a:ext uri="{28A0092B-C50C-407E-A947-70E740481C1C}">
+                <a14:useLocalDpi xmlns:a14="http://schemas.microsoft.com/office/drawing/2010/main" val="0"/>
+              </a:ext>
+            </a:extLst>
+          </a:blip>
+          <a:stretch>
+            <a:fillRect/>
+          </a:stretch>
+        </p:blipFill>
+        <p:spPr>
+          <a:xfrm>
+            <a:off x="404002" y="1435323"/>
+            <a:ext cx="5250425" cy="3331085"/>
+          </a:xfrm>
+          <a:prstGeom prst="rect">
+            <a:avLst/>
+          </a:prstGeom>
+        </p:spPr>
+      </p:pic>
+      <p:pic>
+        <p:nvPicPr>
+          <p:cNvPr id="8" name="Picture 7" descr="Graphical user interface, text, application, chat or text message&#10;&#10;Description automatically generated">
+            <a:extLst>
+              <a:ext uri="{FF2B5EF4-FFF2-40B4-BE49-F238E27FC236}">
+                <a16:creationId xmlns:a16="http://schemas.microsoft.com/office/drawing/2014/main" id="{D61F927A-DF6D-4B38-BC60-70473455459E}"/>
+              </a:ext>
+            </a:extLst>
+          </p:cNvPr>
+          <p:cNvPicPr>
+            <a:picLocks noChangeAspect="1"/>
+          </p:cNvPicPr>
+          <p:nvPr/>
+        </p:nvPicPr>
+        <p:blipFill>
+          <a:blip r:embed="rId3">
+            <a:extLst>
+              <a:ext uri="{28A0092B-C50C-407E-A947-70E740481C1C}">
+                <a14:useLocalDpi xmlns:a14="http://schemas.microsoft.com/office/drawing/2010/main" val="0"/>
+              </a:ext>
+            </a:extLst>
+          </a:blip>
+          <a:stretch>
+            <a:fillRect/>
+          </a:stretch>
+        </p:blipFill>
+        <p:spPr>
+          <a:xfrm>
+            <a:off x="6060945" y="3791205"/>
+            <a:ext cx="2593605" cy="2376610"/>
+          </a:xfrm>
+          <a:prstGeom prst="rect">
+            <a:avLst/>
+          </a:prstGeom>
+        </p:spPr>
+      </p:pic>
+      <p:pic>
+        <p:nvPicPr>
+          <p:cNvPr id="10" name="Picture 9" descr="Graphical user interface, text, application, chat or text message&#10;&#10;Description automatically generated">
+            <a:extLst>
+              <a:ext uri="{FF2B5EF4-FFF2-40B4-BE49-F238E27FC236}">
+                <a16:creationId xmlns:a16="http://schemas.microsoft.com/office/drawing/2014/main" id="{683FC199-9D01-4BA1-B7C3-15A462D13569}"/>
+              </a:ext>
+            </a:extLst>
+          </p:cNvPr>
+          <p:cNvPicPr>
+            <a:picLocks noChangeAspect="1"/>
+          </p:cNvPicPr>
+          <p:nvPr/>
+        </p:nvPicPr>
+        <p:blipFill>
+          <a:blip r:embed="rId4">
+            <a:extLst>
+              <a:ext uri="{28A0092B-C50C-407E-A947-70E740481C1C}">
+                <a14:useLocalDpi xmlns:a14="http://schemas.microsoft.com/office/drawing/2010/main" val="0"/>
+              </a:ext>
+            </a:extLst>
+          </a:blip>
+          <a:stretch>
+            <a:fillRect/>
+          </a:stretch>
+        </p:blipFill>
+        <p:spPr>
+          <a:xfrm>
+            <a:off x="9061068" y="837948"/>
+            <a:ext cx="2593605" cy="3765915"/>
+          </a:xfrm>
+          <a:prstGeom prst="rect">
+            <a:avLst/>
+          </a:prstGeom>
+        </p:spPr>
+      </p:pic>
+      <p:sp>
+        <p:nvSpPr>
+          <p:cNvPr id="11" name="TextBox 10">
+            <a:extLst>
+              <a:ext uri="{FF2B5EF4-FFF2-40B4-BE49-F238E27FC236}">
+                <a16:creationId xmlns:a16="http://schemas.microsoft.com/office/drawing/2014/main" id="{0C3AFDAA-DBD1-4CA8-BA3A-1DC99B5F18D1}"/>
+              </a:ext>
+            </a:extLst>
+          </p:cNvPr>
+          <p:cNvSpPr txBox="1"/>
+          <p:nvPr/>
+        </p:nvSpPr>
+        <p:spPr>
+          <a:xfrm>
+            <a:off x="537327" y="607115"/>
+            <a:ext cx="6080289" cy="461665"/>
+          </a:xfrm>
+          <a:prstGeom prst="rect">
+            <a:avLst/>
+          </a:prstGeom>
+          <a:noFill/>
+        </p:spPr>
+        <p:txBody>
+          <a:bodyPr wrap="square" rtlCol="0">
+            <a:spAutoFit/>
+          </a:bodyPr>
+          <a:lstStyle/>
+          <a:p>
+            <a:r>
+              <a:rPr lang="sr-Cyrl-RS" sz="2400" dirty="0"/>
+              <a:t>Креирање подсетника</a:t>
+            </a:r>
+            <a:endParaRPr lang="en-US" sz="2400" dirty="0"/>
+          </a:p>
+        </p:txBody>
+      </p:sp>
     </p:spTree>
     <p:extLst>
       <p:ext uri="{BB962C8B-B14F-4D97-AF65-F5344CB8AC3E}">
-        <p14:creationId xmlns:p14="http://schemas.microsoft.com/office/powerpoint/2010/main" val="851667399"/>
+        <p14:creationId xmlns:p14="http://schemas.microsoft.com/office/powerpoint/2010/main" val="3548763054"/>
       </p:ext>
     </p:extLst>
   </p:cSld>
@@ -5330,84 +6439,47 @@
           <a:chExt cx="0" cy="0"/>
         </a:xfrm>
       </p:grpSpPr>
-      <p:sp>
-        <p:nvSpPr>
-          <p:cNvPr id="2" name="Title 1">
-            <a:extLst>
-              <a:ext uri="{FF2B5EF4-FFF2-40B4-BE49-F238E27FC236}">
-                <a16:creationId xmlns:a16="http://schemas.microsoft.com/office/drawing/2014/main" id="{9C9D67C1-B666-4153-81BF-52E4F2DDDD1E}"/>
-              </a:ext>
-            </a:extLst>
-          </p:cNvPr>
-          <p:cNvSpPr>
-            <a:spLocks noGrp="1"/>
-          </p:cNvSpPr>
-          <p:nvPr>
-            <p:ph type="title"/>
-          </p:nvPr>
-        </p:nvSpPr>
+      <p:pic>
+        <p:nvPicPr>
+          <p:cNvPr id="6" name="Content Placeholder 5" descr="Graphical user interface, text, application, email&#10;&#10;Description automatically generated">
+            <a:extLst>
+              <a:ext uri="{FF2B5EF4-FFF2-40B4-BE49-F238E27FC236}">
+                <a16:creationId xmlns:a16="http://schemas.microsoft.com/office/drawing/2014/main" id="{C5E9ACB4-C651-4A78-A129-78E4C9262CEC}"/>
+              </a:ext>
+            </a:extLst>
+          </p:cNvPr>
+          <p:cNvPicPr>
+            <a:picLocks noGrp="1" noChangeAspect="1"/>
+          </p:cNvPicPr>
+          <p:nvPr>
+            <p:ph idx="1"/>
+          </p:nvPr>
+        </p:nvPicPr>
+        <p:blipFill>
+          <a:blip r:embed="rId2">
+            <a:extLst>
+              <a:ext uri="{28A0092B-C50C-407E-A947-70E740481C1C}">
+                <a14:useLocalDpi xmlns:a14="http://schemas.microsoft.com/office/drawing/2010/main" val="0"/>
+              </a:ext>
+            </a:extLst>
+          </a:blip>
+          <a:stretch>
+            <a:fillRect/>
+          </a:stretch>
+        </p:blipFill>
         <p:spPr>
           <a:xfrm>
-            <a:off x="838200" y="2352534"/>
-            <a:ext cx="10515600" cy="1325563"/>
+            <a:off x="782048" y="984591"/>
+            <a:ext cx="10627903" cy="5058500"/>
           </a:xfrm>
         </p:spPr>
-        <p:txBody>
-          <a:bodyPr/>
-          <a:lstStyle/>
-          <a:p>
-            <a:pPr algn="ctr"/>
-            <a:r>
-              <a:rPr lang="sr-Cyrl-RS" dirty="0"/>
-              <a:t>Хвала на пажњи!</a:t>
-            </a:r>
-            <a:endParaRPr lang="en-US" dirty="0"/>
-          </a:p>
-        </p:txBody>
-      </p:sp>
-      <p:sp>
-        <p:nvSpPr>
-          <p:cNvPr id="3" name="Content Placeholder 2">
-            <a:extLst>
-              <a:ext uri="{FF2B5EF4-FFF2-40B4-BE49-F238E27FC236}">
-                <a16:creationId xmlns:a16="http://schemas.microsoft.com/office/drawing/2014/main" id="{D866DD0C-75FB-4E6D-B6DD-162B0CA9A9DC}"/>
-              </a:ext>
-            </a:extLst>
-          </p:cNvPr>
-          <p:cNvSpPr>
-            <a:spLocks noGrp="1"/>
-          </p:cNvSpPr>
-          <p:nvPr>
-            <p:ph idx="1"/>
-          </p:nvPr>
-        </p:nvSpPr>
-        <p:spPr>
-          <a:xfrm>
-            <a:off x="4814047" y="3671700"/>
-            <a:ext cx="2563906" cy="944469"/>
-          </a:xfrm>
-        </p:spPr>
-        <p:txBody>
-          <a:bodyPr/>
-          <a:lstStyle/>
-          <a:p>
-            <a:pPr marL="0" indent="0">
-              <a:buNone/>
-            </a:pPr>
-            <a:r>
-              <a:rPr lang="sr-Cyrl-RS" dirty="0"/>
-              <a:t>Питања?</a:t>
-            </a:r>
-            <a:endParaRPr lang="en-US" dirty="0"/>
-          </a:p>
-        </p:txBody>
-      </p:sp>
+      </p:pic>
       <p:sp>
         <p:nvSpPr>
           <p:cNvPr id="4" name="Slide Number Placeholder 3">
             <a:extLst>
               <a:ext uri="{FF2B5EF4-FFF2-40B4-BE49-F238E27FC236}">
-                <a16:creationId xmlns:a16="http://schemas.microsoft.com/office/drawing/2014/main" id="{2CA272C5-B256-4AA6-B329-5B49190A8BD8}"/>
+                <a16:creationId xmlns:a16="http://schemas.microsoft.com/office/drawing/2014/main" id="{6BCB0C5C-FA69-4503-8247-38D3AD4B809D}"/>
               </a:ext>
             </a:extLst>
           </p:cNvPr>
@@ -5431,10 +6503,46 @@
           </a:p>
         </p:txBody>
       </p:sp>
+      <p:sp>
+        <p:nvSpPr>
+          <p:cNvPr id="7" name="TextBox 6">
+            <a:extLst>
+              <a:ext uri="{FF2B5EF4-FFF2-40B4-BE49-F238E27FC236}">
+                <a16:creationId xmlns:a16="http://schemas.microsoft.com/office/drawing/2014/main" id="{267955BB-2894-4A2E-9EE7-255114798DB2}"/>
+              </a:ext>
+            </a:extLst>
+          </p:cNvPr>
+          <p:cNvSpPr txBox="1"/>
+          <p:nvPr/>
+        </p:nvSpPr>
+        <p:spPr>
+          <a:xfrm>
+            <a:off x="914400" y="438085"/>
+            <a:ext cx="8116478" cy="461665"/>
+          </a:xfrm>
+          <a:prstGeom prst="rect">
+            <a:avLst/>
+          </a:prstGeom>
+          <a:noFill/>
+        </p:spPr>
+        <p:txBody>
+          <a:bodyPr wrap="square" rtlCol="0">
+            <a:spAutoFit/>
+          </a:bodyPr>
+          <a:lstStyle/>
+          <a:p>
+            <a:r>
+              <a:rPr lang="sr-Cyrl-RS" sz="2400" dirty="0"/>
+              <a:t>Страница са опцијама – са креираним подсетницима</a:t>
+            </a:r>
+            <a:endParaRPr lang="en-US" sz="2400" dirty="0"/>
+          </a:p>
+        </p:txBody>
+      </p:sp>
     </p:spTree>
     <p:extLst>
       <p:ext uri="{BB962C8B-B14F-4D97-AF65-F5344CB8AC3E}">
-        <p14:creationId xmlns:p14="http://schemas.microsoft.com/office/powerpoint/2010/main" val="4238611157"/>
+        <p14:creationId xmlns:p14="http://schemas.microsoft.com/office/powerpoint/2010/main" val="545176897"/>
       </p:ext>
     </p:extLst>
   </p:cSld>

</xml_diff>

<commit_message>
ppt gotov + word typo
</commit_message>
<xml_diff>
--- a/Aleksandra Bogicevic 170390.pptx
+++ b/Aleksandra Bogicevic 170390.pptx
@@ -4214,11 +4214,13 @@
         <p:spPr>
           <a:xfrm>
             <a:off x="838200" y="1690688"/>
-            <a:ext cx="10515600" cy="4351338"/>
+            <a:ext cx="5257800" cy="4351338"/>
           </a:xfrm>
         </p:spPr>
         <p:txBody>
-          <a:bodyPr/>
+          <a:bodyPr>
+            <a:normAutofit fontScale="92500" lnSpcReduction="20000"/>
+          </a:bodyPr>
           <a:lstStyle/>
           <a:p>
             <a:pPr marL="342900" marR="0" lvl="0" indent="-342900" algn="just">
@@ -4235,7 +4237,33 @@
               <a:buChar char=""/>
             </a:pPr>
             <a:r>
-              <a:rPr lang="en-US" sz="1600" i="1" dirty="0" err="1">
+              <a:rPr lang="sr-Cyrl-RS" sz="1700" dirty="0">
+                <a:latin typeface="Times New Roman" panose="02020603050405020304" pitchFamily="18" charset="0"/>
+                <a:ea typeface="Calibri" panose="020F0502020204030204" pitchFamily="34" charset="0"/>
+                <a:cs typeface="Times New Roman" panose="02020603050405020304" pitchFamily="18" charset="0"/>
+              </a:rPr>
+              <a:t>Структура система:</a:t>
+            </a:r>
+            <a:endParaRPr lang="sr-Latn-RS" sz="1700" dirty="0">
+              <a:effectLst/>
+              <a:latin typeface="Times New Roman" panose="02020603050405020304" pitchFamily="18" charset="0"/>
+              <a:ea typeface="Calibri" panose="020F0502020204030204" pitchFamily="34" charset="0"/>
+              <a:cs typeface="Times New Roman" panose="02020603050405020304" pitchFamily="18" charset="0"/>
+            </a:endParaRPr>
+          </a:p>
+          <a:p>
+            <a:pPr marL="800100" lvl="1" indent="-342900" algn="just">
+              <a:lnSpc>
+                <a:spcPct val="150000"/>
+              </a:lnSpc>
+              <a:spcBef>
+                <a:spcPts val="0"/>
+              </a:spcBef>
+              <a:buFont typeface="Symbol" panose="05050102010706020507" pitchFamily="18" charset="2"/>
+              <a:buChar char=""/>
+            </a:pPr>
+            <a:r>
+              <a:rPr lang="en-US" sz="1700" i="1" dirty="0" err="1">
                 <a:effectLst/>
                 <a:latin typeface="Times New Roman" panose="02020603050405020304" pitchFamily="18" charset="0"/>
                 <a:ea typeface="Calibri" panose="020F0502020204030204" pitchFamily="34" charset="0"/>
@@ -4243,7 +4271,7 @@
               </a:rPr>
               <a:t>manifest.json</a:t>
             </a:r>
-            <a:endParaRPr lang="en-US" sz="1600" dirty="0">
+            <a:endParaRPr lang="en-US" sz="1700" dirty="0">
               <a:effectLst/>
               <a:latin typeface="Times New Roman" panose="02020603050405020304" pitchFamily="18" charset="0"/>
               <a:ea typeface="Calibri" panose="020F0502020204030204" pitchFamily="34" charset="0"/>
@@ -4251,30 +4279,27 @@
             </a:endParaRPr>
           </a:p>
           <a:p>
-            <a:pPr marL="342900" marR="0" lvl="0" indent="-342900" algn="just">
+            <a:pPr marL="800100" lvl="1" indent="-342900" algn="just">
               <a:lnSpc>
                 <a:spcPct val="150000"/>
               </a:lnSpc>
               <a:spcBef>
                 <a:spcPts val="0"/>
               </a:spcBef>
-              <a:spcAft>
-                <a:spcPts val="0"/>
-              </a:spcAft>
               <a:buFont typeface="Symbol" panose="05050102010706020507" pitchFamily="18" charset="2"/>
               <a:buChar char=""/>
             </a:pPr>
             <a:r>
-              <a:rPr lang="sr-Cyrl-RS" sz="1600" dirty="0">
+              <a:rPr lang="sr-Cyrl-RS" sz="1700" dirty="0">
                 <a:effectLst/>
                 <a:latin typeface="Times New Roman" panose="02020603050405020304" pitchFamily="18" charset="0"/>
                 <a:ea typeface="Calibri" panose="020F0502020204030204" pitchFamily="34" charset="0"/>
                 <a:cs typeface="Times New Roman" panose="02020603050405020304" pitchFamily="18" charset="0"/>
               </a:rPr>
-              <a:t>дадтотеке које чине страницу са опцијама</a:t>
-            </a:r>
-            <a:r>
-              <a:rPr lang="en-US" sz="1600" dirty="0">
+              <a:t>датотеке које чине страницу са опцијама</a:t>
+            </a:r>
+            <a:r>
+              <a:rPr lang="en-US" sz="1700" dirty="0">
                 <a:effectLst/>
                 <a:latin typeface="Times New Roman" panose="02020603050405020304" pitchFamily="18" charset="0"/>
                 <a:ea typeface="Calibri" panose="020F0502020204030204" pitchFamily="34" charset="0"/>
@@ -4284,21 +4309,18 @@
             </a:r>
           </a:p>
           <a:p>
-            <a:pPr marL="742950" marR="0" lvl="1" indent="-285750" algn="just">
+            <a:pPr marL="1200150" lvl="2" indent="-285750" algn="just">
               <a:lnSpc>
                 <a:spcPct val="150000"/>
               </a:lnSpc>
               <a:spcBef>
                 <a:spcPts val="0"/>
               </a:spcBef>
-              <a:spcAft>
-                <a:spcPts val="0"/>
-              </a:spcAft>
               <a:buFont typeface="Courier New" panose="02070309020205020404" pitchFamily="49" charset="0"/>
               <a:buChar char="-"/>
             </a:pPr>
             <a:r>
-              <a:rPr lang="sr-Cyrl-RS" sz="1600" dirty="0">
+              <a:rPr lang="sr-Cyrl-RS" sz="1700" dirty="0">
                 <a:effectLst/>
                 <a:latin typeface="Times New Roman" panose="02020603050405020304" pitchFamily="18" charset="0"/>
                 <a:ea typeface="Calibri" panose="020F0502020204030204" pitchFamily="34" charset="0"/>
@@ -4307,7 +4329,7 @@
               <a:t> </a:t>
             </a:r>
             <a:r>
-              <a:rPr lang="en-US" sz="1600" i="1" dirty="0">
+              <a:rPr lang="en-US" sz="1700" i="1" dirty="0">
                 <a:effectLst/>
                 <a:latin typeface="Times New Roman" panose="02020603050405020304" pitchFamily="18" charset="0"/>
                 <a:ea typeface="Calibri" panose="020F0502020204030204" pitchFamily="34" charset="0"/>
@@ -4315,7 +4337,7 @@
               </a:rPr>
               <a:t>options.html</a:t>
             </a:r>
-            <a:endParaRPr lang="en-US" sz="1600" dirty="0">
+            <a:endParaRPr lang="en-US" sz="1700" dirty="0">
               <a:effectLst/>
               <a:latin typeface="Times New Roman" panose="02020603050405020304" pitchFamily="18" charset="0"/>
               <a:ea typeface="Calibri" panose="020F0502020204030204" pitchFamily="34" charset="0"/>
@@ -4323,21 +4345,18 @@
             </a:endParaRPr>
           </a:p>
           <a:p>
-            <a:pPr marL="742950" marR="0" lvl="1" indent="-285750" algn="just">
+            <a:pPr marL="1200150" lvl="2" indent="-285750" algn="just">
               <a:lnSpc>
                 <a:spcPct val="150000"/>
               </a:lnSpc>
               <a:spcBef>
                 <a:spcPts val="0"/>
               </a:spcBef>
-              <a:spcAft>
-                <a:spcPts val="0"/>
-              </a:spcAft>
               <a:buFont typeface="Courier New" panose="02070309020205020404" pitchFamily="49" charset="0"/>
               <a:buChar char="-"/>
             </a:pPr>
             <a:r>
-              <a:rPr lang="en-US" sz="1600" i="1" dirty="0">
+              <a:rPr lang="en-US" sz="1700" i="1" dirty="0">
                 <a:effectLst/>
                 <a:latin typeface="Times New Roman" panose="02020603050405020304" pitchFamily="18" charset="0"/>
                 <a:ea typeface="Calibri" panose="020F0502020204030204" pitchFamily="34" charset="0"/>
@@ -4345,7 +4364,7 @@
               </a:rPr>
               <a:t> options.css</a:t>
             </a:r>
-            <a:endParaRPr lang="en-US" sz="1600" dirty="0">
+            <a:endParaRPr lang="en-US" sz="1700" dirty="0">
               <a:effectLst/>
               <a:latin typeface="Times New Roman" panose="02020603050405020304" pitchFamily="18" charset="0"/>
               <a:ea typeface="Calibri" panose="020F0502020204030204" pitchFamily="34" charset="0"/>
@@ -4353,21 +4372,18 @@
             </a:endParaRPr>
           </a:p>
           <a:p>
-            <a:pPr marL="742950" marR="0" lvl="1" indent="-285750" algn="just">
+            <a:pPr marL="1200150" lvl="2" indent="-285750" algn="just">
               <a:lnSpc>
                 <a:spcPct val="150000"/>
               </a:lnSpc>
               <a:spcBef>
                 <a:spcPts val="0"/>
               </a:spcBef>
-              <a:spcAft>
-                <a:spcPts val="0"/>
-              </a:spcAft>
               <a:buFont typeface="Courier New" panose="02070309020205020404" pitchFamily="49" charset="0"/>
               <a:buChar char="-"/>
             </a:pPr>
             <a:r>
-              <a:rPr lang="en-US" sz="1600" i="1" dirty="0">
+              <a:rPr lang="en-US" sz="1700" i="1" dirty="0">
                 <a:effectLst/>
                 <a:latin typeface="Times New Roman" panose="02020603050405020304" pitchFamily="18" charset="0"/>
                 <a:ea typeface="Calibri" panose="020F0502020204030204" pitchFamily="34" charset="0"/>
@@ -4375,7 +4391,7 @@
               </a:rPr>
               <a:t> options.js</a:t>
             </a:r>
-            <a:endParaRPr lang="en-US" sz="1600" dirty="0">
+            <a:endParaRPr lang="en-US" sz="1700" dirty="0">
               <a:effectLst/>
               <a:latin typeface="Times New Roman" panose="02020603050405020304" pitchFamily="18" charset="0"/>
               <a:ea typeface="Calibri" panose="020F0502020204030204" pitchFamily="34" charset="0"/>
@@ -4383,21 +4399,18 @@
             </a:endParaRPr>
           </a:p>
           <a:p>
-            <a:pPr marL="342900" marR="0" lvl="0" indent="-342900" algn="just">
+            <a:pPr marL="800100" lvl="1" indent="-342900" algn="just">
               <a:lnSpc>
                 <a:spcPct val="150000"/>
               </a:lnSpc>
               <a:spcBef>
                 <a:spcPts val="0"/>
               </a:spcBef>
-              <a:spcAft>
-                <a:spcPts val="0"/>
-              </a:spcAft>
               <a:buFont typeface="Symbol" panose="05050102010706020507" pitchFamily="18" charset="2"/>
               <a:buChar char=""/>
             </a:pPr>
             <a:r>
-              <a:rPr lang="sr-Cyrl-RS" sz="1600" dirty="0">
+              <a:rPr lang="sr-Cyrl-RS" sz="1700" dirty="0">
                 <a:effectLst/>
                 <a:latin typeface="Times New Roman" panose="02020603050405020304" pitchFamily="18" charset="0"/>
                 <a:ea typeface="Calibri" panose="020F0502020204030204" pitchFamily="34" charset="0"/>
@@ -4406,7 +4419,7 @@
               <a:t>датотеке које чине кориснички интерфејс екстензије</a:t>
             </a:r>
             <a:r>
-              <a:rPr lang="en-US" sz="1600" dirty="0">
+              <a:rPr lang="en-US" sz="1700" dirty="0">
                 <a:effectLst/>
                 <a:latin typeface="Times New Roman" panose="02020603050405020304" pitchFamily="18" charset="0"/>
                 <a:ea typeface="Calibri" panose="020F0502020204030204" pitchFamily="34" charset="0"/>
@@ -4414,23 +4427,35 @@
               </a:rPr>
               <a:t>:</a:t>
             </a:r>
-          </a:p>
-          <a:p>
-            <a:pPr marL="742950" marR="0" lvl="1" indent="-285750" algn="just">
+            <a:r>
+              <a:rPr lang="sr-Cyrl-RS" sz="1700" dirty="0">
+                <a:effectLst/>
+                <a:latin typeface="Times New Roman" panose="02020603050405020304" pitchFamily="18" charset="0"/>
+                <a:ea typeface="Calibri" panose="020F0502020204030204" pitchFamily="34" charset="0"/>
+                <a:cs typeface="Times New Roman" panose="02020603050405020304" pitchFamily="18" charset="0"/>
+              </a:rPr>
+              <a:t>	</a:t>
+            </a:r>
+            <a:endParaRPr lang="en-US" sz="1700" dirty="0">
+              <a:effectLst/>
+              <a:latin typeface="Times New Roman" panose="02020603050405020304" pitchFamily="18" charset="0"/>
+              <a:ea typeface="Calibri" panose="020F0502020204030204" pitchFamily="34" charset="0"/>
+              <a:cs typeface="Times New Roman" panose="02020603050405020304" pitchFamily="18" charset="0"/>
+            </a:endParaRPr>
+          </a:p>
+          <a:p>
+            <a:pPr marL="1200150" lvl="2" indent="-285750" algn="just">
               <a:lnSpc>
                 <a:spcPct val="150000"/>
               </a:lnSpc>
               <a:spcBef>
                 <a:spcPts val="0"/>
               </a:spcBef>
-              <a:spcAft>
-                <a:spcPts val="0"/>
-              </a:spcAft>
               <a:buFont typeface="Courier New" panose="02070309020205020404" pitchFamily="49" charset="0"/>
               <a:buChar char="-"/>
             </a:pPr>
             <a:r>
-              <a:rPr lang="en-US" sz="1600" i="1" dirty="0">
+              <a:rPr lang="en-US" sz="1700" i="1" dirty="0">
                 <a:effectLst/>
                 <a:latin typeface="Times New Roman" panose="02020603050405020304" pitchFamily="18" charset="0"/>
                 <a:ea typeface="Calibri" panose="020F0502020204030204" pitchFamily="34" charset="0"/>
@@ -4438,7 +4463,7 @@
               </a:rPr>
               <a:t>popup.html</a:t>
             </a:r>
-            <a:endParaRPr lang="en-US" sz="1600" dirty="0">
+            <a:endParaRPr lang="en-US" sz="1700" dirty="0">
               <a:effectLst/>
               <a:latin typeface="Times New Roman" panose="02020603050405020304" pitchFamily="18" charset="0"/>
               <a:ea typeface="Calibri" panose="020F0502020204030204" pitchFamily="34" charset="0"/>
@@ -4446,21 +4471,18 @@
             </a:endParaRPr>
           </a:p>
           <a:p>
-            <a:pPr marL="742950" marR="0" lvl="1" indent="-285750" algn="just">
+            <a:pPr marL="1200150" lvl="2" indent="-285750" algn="just">
               <a:lnSpc>
                 <a:spcPct val="150000"/>
               </a:lnSpc>
               <a:spcBef>
                 <a:spcPts val="0"/>
               </a:spcBef>
-              <a:spcAft>
-                <a:spcPts val="0"/>
-              </a:spcAft>
               <a:buFont typeface="Courier New" panose="02070309020205020404" pitchFamily="49" charset="0"/>
               <a:buChar char="-"/>
             </a:pPr>
             <a:r>
-              <a:rPr lang="en-US" sz="1600" i="1" dirty="0">
+              <a:rPr lang="en-US" sz="1700" i="1" dirty="0">
                 <a:effectLst/>
                 <a:latin typeface="Times New Roman" panose="02020603050405020304" pitchFamily="18" charset="0"/>
                 <a:ea typeface="Calibri" panose="020F0502020204030204" pitchFamily="34" charset="0"/>
@@ -4468,7 +4490,7 @@
               </a:rPr>
               <a:t>popup.css</a:t>
             </a:r>
-            <a:endParaRPr lang="en-US" sz="1600" dirty="0">
+            <a:endParaRPr lang="en-US" sz="1700" dirty="0">
               <a:effectLst/>
               <a:latin typeface="Times New Roman" panose="02020603050405020304" pitchFamily="18" charset="0"/>
               <a:ea typeface="Calibri" panose="020F0502020204030204" pitchFamily="34" charset="0"/>
@@ -4476,21 +4498,18 @@
             </a:endParaRPr>
           </a:p>
           <a:p>
-            <a:pPr marL="342900" marR="0" lvl="0" indent="-342900" algn="just">
+            <a:pPr marL="800100" lvl="1" indent="-342900" algn="just">
               <a:lnSpc>
                 <a:spcPct val="150000"/>
               </a:lnSpc>
               <a:spcBef>
                 <a:spcPts val="0"/>
               </a:spcBef>
-              <a:spcAft>
-                <a:spcPts val="0"/>
-              </a:spcAft>
               <a:buFont typeface="Symbol" panose="05050102010706020507" pitchFamily="18" charset="2"/>
               <a:buChar char=""/>
             </a:pPr>
             <a:r>
-              <a:rPr lang="sr-Cyrl-RS" sz="1600" dirty="0">
+              <a:rPr lang="sr-Cyrl-RS" sz="1700" dirty="0">
                 <a:effectLst/>
                 <a:latin typeface="Times New Roman" panose="02020603050405020304" pitchFamily="18" charset="0"/>
                 <a:ea typeface="Calibri" panose="020F0502020204030204" pitchFamily="34" charset="0"/>
@@ -4499,7 +4518,7 @@
               <a:t>позадинска скрипта </a:t>
             </a:r>
             <a:r>
-              <a:rPr lang="en-US" sz="1600" dirty="0">
+              <a:rPr lang="en-US" sz="1700" dirty="0">
                 <a:effectLst/>
                 <a:latin typeface="Times New Roman" panose="02020603050405020304" pitchFamily="18" charset="0"/>
                 <a:ea typeface="Calibri" panose="020F0502020204030204" pitchFamily="34" charset="0"/>
@@ -4508,7 +4527,7 @@
               <a:t>(</a:t>
             </a:r>
             <a:r>
-              <a:rPr lang="en-US" sz="1600" i="1" dirty="0">
+              <a:rPr lang="en-US" sz="1700" i="1" dirty="0">
                 <a:effectLst/>
                 <a:latin typeface="Times New Roman" panose="02020603050405020304" pitchFamily="18" charset="0"/>
                 <a:ea typeface="Calibri" panose="020F0502020204030204" pitchFamily="34" charset="0"/>
@@ -4517,7 +4536,7 @@
               <a:t>background.js</a:t>
             </a:r>
             <a:r>
-              <a:rPr lang="en-US" sz="1600" dirty="0">
+              <a:rPr lang="en-US" sz="1700" dirty="0">
                 <a:effectLst/>
                 <a:latin typeface="Times New Roman" panose="02020603050405020304" pitchFamily="18" charset="0"/>
                 <a:ea typeface="Calibri" panose="020F0502020204030204" pitchFamily="34" charset="0"/>
@@ -4527,21 +4546,18 @@
             </a:r>
           </a:p>
           <a:p>
-            <a:pPr marL="342900" marR="0" lvl="0" indent="-342900" algn="just">
+            <a:pPr marL="800100" lvl="1" indent="-342900" algn="just">
               <a:lnSpc>
                 <a:spcPct val="150000"/>
               </a:lnSpc>
               <a:spcBef>
                 <a:spcPts val="0"/>
               </a:spcBef>
-              <a:spcAft>
-                <a:spcPts val="0"/>
-              </a:spcAft>
               <a:buFont typeface="Symbol" panose="05050102010706020507" pitchFamily="18" charset="2"/>
               <a:buChar char=""/>
             </a:pPr>
             <a:r>
-              <a:rPr lang="sr-Cyrl-RS" sz="1600" dirty="0">
+              <a:rPr lang="sr-Cyrl-RS" sz="1700" dirty="0">
                 <a:effectLst/>
                 <a:latin typeface="Times New Roman" panose="02020603050405020304" pitchFamily="18" charset="0"/>
                 <a:ea typeface="Calibri" panose="020F0502020204030204" pitchFamily="34" charset="0"/>
@@ -4550,7 +4566,7 @@
               <a:t>скрипта садржаја (</a:t>
             </a:r>
             <a:r>
-              <a:rPr lang="en-US" sz="1600" i="1" dirty="0">
+              <a:rPr lang="en-US" sz="1700" i="1" dirty="0">
                 <a:effectLst/>
                 <a:latin typeface="Times New Roman" panose="02020603050405020304" pitchFamily="18" charset="0"/>
                 <a:ea typeface="Calibri" panose="020F0502020204030204" pitchFamily="34" charset="0"/>
@@ -4559,7 +4575,7 @@
               <a:t>content.js</a:t>
             </a:r>
             <a:r>
-              <a:rPr lang="sr-Cyrl-RS" sz="1600" dirty="0">
+              <a:rPr lang="sr-Cyrl-RS" sz="1700" dirty="0">
                 <a:effectLst/>
                 <a:latin typeface="Times New Roman" panose="02020603050405020304" pitchFamily="18" charset="0"/>
                 <a:ea typeface="Calibri" panose="020F0502020204030204" pitchFamily="34" charset="0"/>
@@ -4567,7 +4583,7 @@
               </a:rPr>
               <a:t>)</a:t>
             </a:r>
-            <a:endParaRPr lang="en-US" sz="1600" dirty="0">
+            <a:endParaRPr lang="en-US" sz="1700" dirty="0">
               <a:effectLst/>
               <a:latin typeface="Times New Roman" panose="02020603050405020304" pitchFamily="18" charset="0"/>
               <a:ea typeface="Calibri" panose="020F0502020204030204" pitchFamily="34" charset="0"/>
@@ -4575,21 +4591,18 @@
             </a:endParaRPr>
           </a:p>
           <a:p>
-            <a:pPr marL="342900" marR="0" lvl="0" indent="-342900" algn="just">
+            <a:pPr marL="800100" lvl="1" indent="-342900" algn="just">
               <a:lnSpc>
                 <a:spcPct val="150000"/>
               </a:lnSpc>
               <a:spcBef>
                 <a:spcPts val="0"/>
               </a:spcBef>
-              <a:spcAft>
-                <a:spcPts val="0"/>
-              </a:spcAft>
               <a:buFont typeface="Symbol" panose="05050102010706020507" pitchFamily="18" charset="2"/>
               <a:buChar char=""/>
             </a:pPr>
             <a:r>
-              <a:rPr lang="sr-Cyrl-RS" sz="1600" dirty="0">
+              <a:rPr lang="sr-Cyrl-RS" sz="1700" dirty="0">
                 <a:effectLst/>
                 <a:latin typeface="Times New Roman" panose="02020603050405020304" pitchFamily="18" charset="0"/>
                 <a:ea typeface="Calibri" panose="020F0502020204030204" pitchFamily="34" charset="0"/>
@@ -4597,7 +4610,7 @@
               </a:rPr>
               <a:t>додаци</a:t>
             </a:r>
-            <a:endParaRPr lang="en-US" sz="1600" dirty="0">
+            <a:endParaRPr lang="en-US" sz="1700" dirty="0">
               <a:effectLst/>
               <a:latin typeface="Times New Roman" panose="02020603050405020304" pitchFamily="18" charset="0"/>
               <a:ea typeface="Calibri" panose="020F0502020204030204" pitchFamily="34" charset="0"/>
@@ -4638,6 +4651,328 @@
               <a:t>11</a:t>
             </a:fld>
             <a:endParaRPr lang="en-US"/>
+          </a:p>
+        </p:txBody>
+      </p:sp>
+      <p:sp>
+        <p:nvSpPr>
+          <p:cNvPr id="6" name="Content Placeholder 2">
+            <a:extLst>
+              <a:ext uri="{FF2B5EF4-FFF2-40B4-BE49-F238E27FC236}">
+                <a16:creationId xmlns:a16="http://schemas.microsoft.com/office/drawing/2014/main" id="{41CDF255-1BE0-46F0-8022-1F1D4DDDFDF9}"/>
+              </a:ext>
+            </a:extLst>
+          </p:cNvPr>
+          <p:cNvSpPr txBox="1">
+            <a:spLocks/>
+          </p:cNvSpPr>
+          <p:nvPr/>
+        </p:nvSpPr>
+        <p:spPr>
+          <a:xfrm>
+            <a:off x="7421072" y="1690688"/>
+            <a:ext cx="4498337" cy="4351338"/>
+          </a:xfrm>
+          <a:prstGeom prst="rect">
+            <a:avLst/>
+          </a:prstGeom>
+        </p:spPr>
+        <p:txBody>
+          <a:bodyPr vert="horz" lIns="91440" tIns="45720" rIns="91440" bIns="45720" rtlCol="0">
+            <a:normAutofit/>
+          </a:bodyPr>
+          <a:lstStyle>
+            <a:lvl1pPr marL="228600" indent="-228600" algn="l" defTabSz="914400" rtl="0" eaLnBrk="1" latinLnBrk="0" hangingPunct="1">
+              <a:lnSpc>
+                <a:spcPct val="90000"/>
+              </a:lnSpc>
+              <a:spcBef>
+                <a:spcPts val="1000"/>
+              </a:spcBef>
+              <a:buFont typeface="Arial" panose="020B0604020202020204" pitchFamily="34" charset="0"/>
+              <a:buChar char="•"/>
+              <a:defRPr sz="2800" kern="1200">
+                <a:solidFill>
+                  <a:schemeClr val="tx1"/>
+                </a:solidFill>
+                <a:latin typeface="+mn-lt"/>
+                <a:ea typeface="+mn-ea"/>
+                <a:cs typeface="+mn-cs"/>
+              </a:defRPr>
+            </a:lvl1pPr>
+            <a:lvl2pPr marL="685800" indent="-228600" algn="l" defTabSz="914400" rtl="0" eaLnBrk="1" latinLnBrk="0" hangingPunct="1">
+              <a:lnSpc>
+                <a:spcPct val="90000"/>
+              </a:lnSpc>
+              <a:spcBef>
+                <a:spcPts val="500"/>
+              </a:spcBef>
+              <a:buFont typeface="Arial" panose="020B0604020202020204" pitchFamily="34" charset="0"/>
+              <a:buChar char="•"/>
+              <a:defRPr sz="2400" kern="1200">
+                <a:solidFill>
+                  <a:schemeClr val="tx1"/>
+                </a:solidFill>
+                <a:latin typeface="+mn-lt"/>
+                <a:ea typeface="+mn-ea"/>
+                <a:cs typeface="+mn-cs"/>
+              </a:defRPr>
+            </a:lvl2pPr>
+            <a:lvl3pPr marL="1143000" indent="-228600" algn="l" defTabSz="914400" rtl="0" eaLnBrk="1" latinLnBrk="0" hangingPunct="1">
+              <a:lnSpc>
+                <a:spcPct val="90000"/>
+              </a:lnSpc>
+              <a:spcBef>
+                <a:spcPts val="500"/>
+              </a:spcBef>
+              <a:buFont typeface="Arial" panose="020B0604020202020204" pitchFamily="34" charset="0"/>
+              <a:buChar char="•"/>
+              <a:defRPr sz="2000" kern="1200">
+                <a:solidFill>
+                  <a:schemeClr val="tx1"/>
+                </a:solidFill>
+                <a:latin typeface="+mn-lt"/>
+                <a:ea typeface="+mn-ea"/>
+                <a:cs typeface="+mn-cs"/>
+              </a:defRPr>
+            </a:lvl3pPr>
+            <a:lvl4pPr marL="1600200" indent="-228600" algn="l" defTabSz="914400" rtl="0" eaLnBrk="1" latinLnBrk="0" hangingPunct="1">
+              <a:lnSpc>
+                <a:spcPct val="90000"/>
+              </a:lnSpc>
+              <a:spcBef>
+                <a:spcPts val="500"/>
+              </a:spcBef>
+              <a:buFont typeface="Arial" panose="020B0604020202020204" pitchFamily="34" charset="0"/>
+              <a:buChar char="•"/>
+              <a:defRPr sz="1800" kern="1200">
+                <a:solidFill>
+                  <a:schemeClr val="tx1"/>
+                </a:solidFill>
+                <a:latin typeface="+mn-lt"/>
+                <a:ea typeface="+mn-ea"/>
+                <a:cs typeface="+mn-cs"/>
+              </a:defRPr>
+            </a:lvl4pPr>
+            <a:lvl5pPr marL="2057400" indent="-228600" algn="l" defTabSz="914400" rtl="0" eaLnBrk="1" latinLnBrk="0" hangingPunct="1">
+              <a:lnSpc>
+                <a:spcPct val="90000"/>
+              </a:lnSpc>
+              <a:spcBef>
+                <a:spcPts val="500"/>
+              </a:spcBef>
+              <a:buFont typeface="Arial" panose="020B0604020202020204" pitchFamily="34" charset="0"/>
+              <a:buChar char="•"/>
+              <a:defRPr sz="1800" kern="1200">
+                <a:solidFill>
+                  <a:schemeClr val="tx1"/>
+                </a:solidFill>
+                <a:latin typeface="+mn-lt"/>
+                <a:ea typeface="+mn-ea"/>
+                <a:cs typeface="+mn-cs"/>
+              </a:defRPr>
+            </a:lvl5pPr>
+            <a:lvl6pPr marL="2514600" indent="-228600" algn="l" defTabSz="914400" rtl="0" eaLnBrk="1" latinLnBrk="0" hangingPunct="1">
+              <a:lnSpc>
+                <a:spcPct val="90000"/>
+              </a:lnSpc>
+              <a:spcBef>
+                <a:spcPts val="500"/>
+              </a:spcBef>
+              <a:buFont typeface="Arial" panose="020B0604020202020204" pitchFamily="34" charset="0"/>
+              <a:buChar char="•"/>
+              <a:defRPr sz="1800" kern="1200">
+                <a:solidFill>
+                  <a:schemeClr val="tx1"/>
+                </a:solidFill>
+                <a:latin typeface="+mn-lt"/>
+                <a:ea typeface="+mn-ea"/>
+                <a:cs typeface="+mn-cs"/>
+              </a:defRPr>
+            </a:lvl6pPr>
+            <a:lvl7pPr marL="2971800" indent="-228600" algn="l" defTabSz="914400" rtl="0" eaLnBrk="1" latinLnBrk="0" hangingPunct="1">
+              <a:lnSpc>
+                <a:spcPct val="90000"/>
+              </a:lnSpc>
+              <a:spcBef>
+                <a:spcPts val="500"/>
+              </a:spcBef>
+              <a:buFont typeface="Arial" panose="020B0604020202020204" pitchFamily="34" charset="0"/>
+              <a:buChar char="•"/>
+              <a:defRPr sz="1800" kern="1200">
+                <a:solidFill>
+                  <a:schemeClr val="tx1"/>
+                </a:solidFill>
+                <a:latin typeface="+mn-lt"/>
+                <a:ea typeface="+mn-ea"/>
+                <a:cs typeface="+mn-cs"/>
+              </a:defRPr>
+            </a:lvl7pPr>
+            <a:lvl8pPr marL="3429000" indent="-228600" algn="l" defTabSz="914400" rtl="0" eaLnBrk="1" latinLnBrk="0" hangingPunct="1">
+              <a:lnSpc>
+                <a:spcPct val="90000"/>
+              </a:lnSpc>
+              <a:spcBef>
+                <a:spcPts val="500"/>
+              </a:spcBef>
+              <a:buFont typeface="Arial" panose="020B0604020202020204" pitchFamily="34" charset="0"/>
+              <a:buChar char="•"/>
+              <a:defRPr sz="1800" kern="1200">
+                <a:solidFill>
+                  <a:schemeClr val="tx1"/>
+                </a:solidFill>
+                <a:latin typeface="+mn-lt"/>
+                <a:ea typeface="+mn-ea"/>
+                <a:cs typeface="+mn-cs"/>
+              </a:defRPr>
+            </a:lvl8pPr>
+            <a:lvl9pPr marL="3886200" indent="-228600" algn="l" defTabSz="914400" rtl="0" eaLnBrk="1" latinLnBrk="0" hangingPunct="1">
+              <a:lnSpc>
+                <a:spcPct val="90000"/>
+              </a:lnSpc>
+              <a:spcBef>
+                <a:spcPts val="500"/>
+              </a:spcBef>
+              <a:buFont typeface="Arial" panose="020B0604020202020204" pitchFamily="34" charset="0"/>
+              <a:buChar char="•"/>
+              <a:defRPr sz="1800" kern="1200">
+                <a:solidFill>
+                  <a:schemeClr val="tx1"/>
+                </a:solidFill>
+                <a:latin typeface="+mn-lt"/>
+                <a:ea typeface="+mn-ea"/>
+                <a:cs typeface="+mn-cs"/>
+              </a:defRPr>
+            </a:lvl9pPr>
+          </a:lstStyle>
+          <a:p>
+            <a:pPr marL="342900" indent="-342900" algn="just">
+              <a:lnSpc>
+                <a:spcPct val="150000"/>
+              </a:lnSpc>
+              <a:spcBef>
+                <a:spcPts val="0"/>
+              </a:spcBef>
+              <a:buFont typeface="Symbol" panose="05050102010706020507" pitchFamily="18" charset="2"/>
+              <a:buChar char=""/>
+            </a:pPr>
+            <a:r>
+              <a:rPr lang="sr-Latn-RS" sz="1600" i="1" dirty="0">
+                <a:latin typeface="Times New Roman" panose="02020603050405020304" pitchFamily="18" charset="0"/>
+                <a:ea typeface="Calibri" panose="020F0502020204030204" pitchFamily="34" charset="0"/>
+                <a:cs typeface="Times New Roman" panose="02020603050405020304" pitchFamily="18" charset="0"/>
+              </a:rPr>
+              <a:t>chrome.storage API</a:t>
+            </a:r>
+          </a:p>
+          <a:p>
+            <a:pPr marL="342900" indent="-342900" algn="just">
+              <a:lnSpc>
+                <a:spcPct val="150000"/>
+              </a:lnSpc>
+              <a:spcBef>
+                <a:spcPts val="0"/>
+              </a:spcBef>
+              <a:buFont typeface="Symbol" panose="05050102010706020507" pitchFamily="18" charset="2"/>
+              <a:buChar char=""/>
+            </a:pPr>
+            <a:r>
+              <a:rPr lang="sr-Latn-RS" sz="1600" i="1" dirty="0">
+                <a:latin typeface="Times New Roman" panose="02020603050405020304" pitchFamily="18" charset="0"/>
+                <a:ea typeface="Calibri" panose="020F0502020204030204" pitchFamily="34" charset="0"/>
+                <a:cs typeface="Times New Roman" panose="02020603050405020304" pitchFamily="18" charset="0"/>
+              </a:rPr>
+              <a:t>chrome.alarms API</a:t>
+            </a:r>
+          </a:p>
+          <a:p>
+            <a:pPr marL="342900" indent="-342900" algn="just">
+              <a:lnSpc>
+                <a:spcPct val="150000"/>
+              </a:lnSpc>
+              <a:spcBef>
+                <a:spcPts val="0"/>
+              </a:spcBef>
+              <a:buFont typeface="Symbol" panose="05050102010706020507" pitchFamily="18" charset="2"/>
+              <a:buChar char=""/>
+            </a:pPr>
+            <a:r>
+              <a:rPr lang="sr-Latn-RS" sz="1600" i="1" dirty="0">
+                <a:latin typeface="Times New Roman" panose="02020603050405020304" pitchFamily="18" charset="0"/>
+                <a:ea typeface="Calibri" panose="020F0502020204030204" pitchFamily="34" charset="0"/>
+                <a:cs typeface="Times New Roman" panose="02020603050405020304" pitchFamily="18" charset="0"/>
+              </a:rPr>
+              <a:t>chrome.notifications API</a:t>
+            </a:r>
+          </a:p>
+          <a:p>
+            <a:pPr marL="342900" indent="-342900" algn="just">
+              <a:lnSpc>
+                <a:spcPct val="150000"/>
+              </a:lnSpc>
+              <a:spcBef>
+                <a:spcPts val="0"/>
+              </a:spcBef>
+              <a:buFont typeface="Symbol" panose="05050102010706020507" pitchFamily="18" charset="2"/>
+              <a:buChar char=""/>
+            </a:pPr>
+            <a:endParaRPr lang="sr-Latn-RS" sz="1600" i="1" dirty="0">
+              <a:latin typeface="Times New Roman" panose="02020603050405020304" pitchFamily="18" charset="0"/>
+              <a:ea typeface="Calibri" panose="020F0502020204030204" pitchFamily="34" charset="0"/>
+              <a:cs typeface="Times New Roman" panose="02020603050405020304" pitchFamily="18" charset="0"/>
+            </a:endParaRPr>
+          </a:p>
+          <a:p>
+            <a:pPr marL="342900" indent="-342900" algn="just">
+              <a:lnSpc>
+                <a:spcPct val="150000"/>
+              </a:lnSpc>
+              <a:spcBef>
+                <a:spcPts val="0"/>
+              </a:spcBef>
+              <a:buFont typeface="Symbol" panose="05050102010706020507" pitchFamily="18" charset="2"/>
+              <a:buChar char=""/>
+            </a:pPr>
+            <a:r>
+              <a:rPr lang="sr-Latn-RS" sz="1600" i="1" dirty="0">
+                <a:latin typeface="Times New Roman" panose="02020603050405020304" pitchFamily="18" charset="0"/>
+                <a:ea typeface="Calibri" panose="020F0502020204030204" pitchFamily="34" charset="0"/>
+                <a:cs typeface="Times New Roman" panose="02020603050405020304" pitchFamily="18" charset="0"/>
+              </a:rPr>
+              <a:t>chrome.runtime.sendMessage</a:t>
+            </a:r>
+          </a:p>
+          <a:p>
+            <a:pPr marL="342900" indent="-342900" algn="just">
+              <a:lnSpc>
+                <a:spcPct val="150000"/>
+              </a:lnSpc>
+              <a:spcBef>
+                <a:spcPts val="0"/>
+              </a:spcBef>
+              <a:buFont typeface="Symbol" panose="05050102010706020507" pitchFamily="18" charset="2"/>
+              <a:buChar char=""/>
+            </a:pPr>
+            <a:r>
+              <a:rPr lang="sr-Latn-RS" sz="1600" i="1" dirty="0">
+                <a:latin typeface="Times New Roman" panose="02020603050405020304" pitchFamily="18" charset="0"/>
+                <a:ea typeface="Calibri" panose="020F0502020204030204" pitchFamily="34" charset="0"/>
+                <a:cs typeface="Times New Roman" panose="02020603050405020304" pitchFamily="18" charset="0"/>
+              </a:rPr>
+              <a:t>chrome.runtime.onMessage</a:t>
+            </a:r>
+            <a:endParaRPr lang="en-US" sz="1600" dirty="0">
+              <a:latin typeface="Times New Roman" panose="02020603050405020304" pitchFamily="18" charset="0"/>
+              <a:ea typeface="Calibri" panose="020F0502020204030204" pitchFamily="34" charset="0"/>
+              <a:cs typeface="Times New Roman" panose="02020603050405020304" pitchFamily="18" charset="0"/>
+            </a:endParaRPr>
+          </a:p>
+          <a:p>
+            <a:pPr marL="0" indent="0">
+              <a:buFont typeface="Arial" panose="020B0604020202020204" pitchFamily="34" charset="0"/>
+              <a:buNone/>
+            </a:pPr>
+            <a:endParaRPr lang="en-US" dirty="0"/>
           </a:p>
         </p:txBody>
       </p:sp>
@@ -5137,7 +5472,7 @@
         </p:nvSpPr>
         <p:spPr>
           <a:xfrm>
-            <a:off x="838200" y="1491916"/>
+            <a:off x="838200" y="1595611"/>
             <a:ext cx="10515600" cy="4685047"/>
           </a:xfrm>
         </p:spPr>
@@ -5171,7 +5506,7 @@
           <a:p>
             <a:r>
               <a:rPr lang="sr-Cyrl-RS" dirty="0"/>
-              <a:t>Развој система</a:t>
+              <a:t>Реализација система</a:t>
             </a:r>
           </a:p>
           <a:p>
@@ -5297,7 +5632,7 @@
         </p:nvSpPr>
         <p:spPr>
           <a:xfrm>
-            <a:off x="838200" y="2256490"/>
+            <a:off x="838200" y="2133941"/>
             <a:ext cx="10515600" cy="3512857"/>
           </a:xfrm>
         </p:spPr>
@@ -5615,7 +5950,7 @@
             <a:pPr lvl="1"/>
             <a:r>
               <a:rPr lang="sr-Cyrl-RS" dirty="0"/>
-              <a:t>Неопходан део корисникчких налога на свим друштвеним мрежама</a:t>
+              <a:t>неопходан део корисникчких налога на свим друштвеним мрежама</a:t>
             </a:r>
           </a:p>
           <a:p>
@@ -5668,13 +6003,6 @@
             <a:r>
               <a:rPr lang="en-US" i="1" dirty="0"/>
               <a:t> for Gmail</a:t>
-            </a:r>
-          </a:p>
-          <a:p>
-            <a:pPr lvl="1"/>
-            <a:r>
-              <a:rPr lang="en-US" i="1" dirty="0"/>
-              <a:t>Inbox When Ready</a:t>
             </a:r>
           </a:p>
         </p:txBody>

</xml_diff>

<commit_message>
numeracija slajdova + readme update
</commit_message>
<xml_diff>
--- a/Aleksandra Bogicevic 170390.pptx
+++ b/Aleksandra Bogicevic 170390.pptx
@@ -4132,7 +4132,10 @@
               <a:rPr lang="en-US" smtClean="0"/>
               <a:t>10</a:t>
             </a:fld>
-            <a:endParaRPr lang="en-US"/>
+            <a:r>
+              <a:rPr lang="en-US" dirty="0"/>
+              <a:t>/13</a:t>
+            </a:r>
           </a:p>
         </p:txBody>
       </p:sp>
@@ -4650,7 +4653,10 @@
               <a:rPr lang="en-US" smtClean="0"/>
               <a:t>11</a:t>
             </a:fld>
-            <a:endParaRPr lang="en-US"/>
+            <a:r>
+              <a:rPr lang="en-US" dirty="0"/>
+              <a:t>/13</a:t>
+            </a:r>
           </a:p>
         </p:txBody>
       </p:sp>
@@ -5179,7 +5185,10 @@
               <a:rPr lang="en-US" smtClean="0"/>
               <a:t>12</a:t>
             </a:fld>
-            <a:endParaRPr lang="en-US"/>
+            <a:r>
+              <a:rPr lang="en-US" dirty="0"/>
+              <a:t>/13</a:t>
+            </a:r>
           </a:p>
         </p:txBody>
       </p:sp>
@@ -5310,7 +5319,10 @@
               <a:rPr lang="en-US" smtClean="0"/>
               <a:t>13</a:t>
             </a:fld>
-            <a:endParaRPr lang="en-US"/>
+            <a:r>
+              <a:rPr lang="en-US" dirty="0"/>
+              <a:t>/13</a:t>
+            </a:r>
           </a:p>
         </p:txBody>
       </p:sp>
@@ -5549,7 +5561,10 @@
               <a:rPr lang="en-US" smtClean="0"/>
               <a:t>2</a:t>
             </a:fld>
-            <a:endParaRPr lang="en-US" dirty="0"/>
+            <a:r>
+              <a:rPr lang="en-US" dirty="0"/>
+              <a:t>/13</a:t>
+            </a:r>
           </a:p>
         </p:txBody>
       </p:sp>
@@ -5838,7 +5853,10 @@
               <a:rPr lang="en-US" smtClean="0"/>
               <a:t>3</a:t>
             </a:fld>
-            <a:endParaRPr lang="en-US"/>
+            <a:r>
+              <a:rPr lang="en-US" dirty="0"/>
+              <a:t>/13</a:t>
+            </a:r>
           </a:p>
         </p:txBody>
       </p:sp>
@@ -6032,7 +6050,10 @@
               <a:rPr lang="en-US" smtClean="0"/>
               <a:t>4</a:t>
             </a:fld>
-            <a:endParaRPr lang="en-US"/>
+            <a:r>
+              <a:rPr lang="en-US" dirty="0"/>
+              <a:t>/13</a:t>
+            </a:r>
           </a:p>
         </p:txBody>
       </p:sp>
@@ -6241,7 +6262,10 @@
               <a:rPr lang="en-US" smtClean="0"/>
               <a:t>5</a:t>
             </a:fld>
-            <a:endParaRPr lang="en-US"/>
+            <a:r>
+              <a:rPr lang="en-US" dirty="0"/>
+              <a:t>/13</a:t>
+            </a:r>
           </a:p>
         </p:txBody>
       </p:sp>
@@ -6364,7 +6388,10 @@
               <a:rPr lang="en-US" smtClean="0"/>
               <a:t>6</a:t>
             </a:fld>
-            <a:endParaRPr lang="en-US"/>
+            <a:r>
+              <a:rPr lang="en-US" dirty="0"/>
+              <a:t>/13</a:t>
+            </a:r>
           </a:p>
         </p:txBody>
       </p:sp>
@@ -6494,7 +6521,10 @@
               <a:rPr lang="en-US" smtClean="0"/>
               <a:t>7</a:t>
             </a:fld>
-            <a:endParaRPr lang="en-US"/>
+            <a:r>
+              <a:rPr lang="en-US" dirty="0"/>
+              <a:t>/13</a:t>
+            </a:r>
           </a:p>
         </p:txBody>
       </p:sp>
@@ -6589,7 +6619,10 @@
               <a:rPr lang="en-US" smtClean="0"/>
               <a:t>8</a:t>
             </a:fld>
-            <a:endParaRPr lang="en-US"/>
+            <a:r>
+              <a:rPr lang="en-US" dirty="0"/>
+              <a:t>/13</a:t>
+            </a:r>
           </a:p>
         </p:txBody>
       </p:sp>
@@ -6827,7 +6860,10 @@
               <a:rPr lang="en-US" smtClean="0"/>
               <a:t>9</a:t>
             </a:fld>
-            <a:endParaRPr lang="en-US"/>
+            <a:r>
+              <a:rPr lang="en-US" dirty="0"/>
+              <a:t>/13</a:t>
+            </a:r>
           </a:p>
         </p:txBody>
       </p:sp>

</xml_diff>